<commit_message>
Sample numbers on serial and parallel circuit
</commit_message>
<xml_diff>
--- a/Folien/Exkurs_Elektrotechnik.pptx
+++ b/Folien/Exkurs_Elektrotechnik.pptx
@@ -209,7 +209,7 @@
           <a:p>
             <a:fld id="{1111EAE3-0D17-7D4D-B5C8-7430D3A14508}" type="datetimeFigureOut">
               <a:rPr lang="en-US" smtClean="0"/>
-              <a:t>2/14/22</a:t>
+              <a:t>2/28/22</a:t>
             </a:fld>
             <a:endParaRPr lang="en-US"/>
           </a:p>
@@ -811,7 +811,7 @@
           <a:p>
             <a:fld id="{46878720-212C-42BB-B356-99628BFE1EBF}" type="datetimeFigureOut">
               <a:rPr lang="en-US" smtClean="0"/>
-              <a:t>2/14/22</a:t>
+              <a:t>2/28/22</a:t>
             </a:fld>
             <a:endParaRPr lang="en-US"/>
           </a:p>
@@ -1009,7 +1009,7 @@
           <a:p>
             <a:fld id="{46878720-212C-42BB-B356-99628BFE1EBF}" type="datetimeFigureOut">
               <a:rPr lang="en-US" smtClean="0"/>
-              <a:t>2/14/22</a:t>
+              <a:t>2/28/22</a:t>
             </a:fld>
             <a:endParaRPr lang="en-US"/>
           </a:p>
@@ -1217,7 +1217,7 @@
           <a:p>
             <a:fld id="{46878720-212C-42BB-B356-99628BFE1EBF}" type="datetimeFigureOut">
               <a:rPr lang="en-US" smtClean="0"/>
-              <a:t>2/14/22</a:t>
+              <a:t>2/28/22</a:t>
             </a:fld>
             <a:endParaRPr lang="en-US"/>
           </a:p>
@@ -3392,7 +3392,7 @@
           <a:p>
             <a:fld id="{46878720-212C-42BB-B356-99628BFE1EBF}" type="datetimeFigureOut">
               <a:rPr lang="en-US" smtClean="0"/>
-              <a:t>2/14/22</a:t>
+              <a:t>2/28/22</a:t>
             </a:fld>
             <a:endParaRPr lang="en-US"/>
           </a:p>
@@ -4599,7 +4599,7 @@
           <a:p>
             <a:fld id="{46878720-212C-42BB-B356-99628BFE1EBF}" type="datetimeFigureOut">
               <a:rPr lang="en-US" smtClean="0"/>
-              <a:t>2/14/22</a:t>
+              <a:t>2/28/22</a:t>
             </a:fld>
             <a:endParaRPr lang="en-US"/>
           </a:p>
@@ -4864,7 +4864,7 @@
           <a:p>
             <a:fld id="{46878720-212C-42BB-B356-99628BFE1EBF}" type="datetimeFigureOut">
               <a:rPr lang="en-US" smtClean="0"/>
-              <a:t>2/14/22</a:t>
+              <a:t>2/28/22</a:t>
             </a:fld>
             <a:endParaRPr lang="en-US"/>
           </a:p>
@@ -5276,7 +5276,7 @@
           <a:p>
             <a:fld id="{46878720-212C-42BB-B356-99628BFE1EBF}" type="datetimeFigureOut">
               <a:rPr lang="en-US" smtClean="0"/>
-              <a:t>2/14/22</a:t>
+              <a:t>2/28/22</a:t>
             </a:fld>
             <a:endParaRPr lang="en-US"/>
           </a:p>
@@ -5417,7 +5417,7 @@
           <a:p>
             <a:fld id="{46878720-212C-42BB-B356-99628BFE1EBF}" type="datetimeFigureOut">
               <a:rPr lang="en-US" smtClean="0"/>
-              <a:t>2/14/22</a:t>
+              <a:t>2/28/22</a:t>
             </a:fld>
             <a:endParaRPr lang="en-US"/>
           </a:p>
@@ -5530,7 +5530,7 @@
           <a:p>
             <a:fld id="{46878720-212C-42BB-B356-99628BFE1EBF}" type="datetimeFigureOut">
               <a:rPr lang="en-US" smtClean="0"/>
-              <a:t>2/14/22</a:t>
+              <a:t>2/28/22</a:t>
             </a:fld>
             <a:endParaRPr lang="en-US"/>
           </a:p>
@@ -5841,7 +5841,7 @@
           <a:p>
             <a:fld id="{46878720-212C-42BB-B356-99628BFE1EBF}" type="datetimeFigureOut">
               <a:rPr lang="en-US" smtClean="0"/>
-              <a:t>2/14/22</a:t>
+              <a:t>2/28/22</a:t>
             </a:fld>
             <a:endParaRPr lang="en-US"/>
           </a:p>
@@ -6129,7 +6129,7 @@
           <a:p>
             <a:fld id="{46878720-212C-42BB-B356-99628BFE1EBF}" type="datetimeFigureOut">
               <a:rPr lang="en-US" smtClean="0"/>
-              <a:t>2/14/22</a:t>
+              <a:t>2/28/22</a:t>
             </a:fld>
             <a:endParaRPr lang="en-US"/>
           </a:p>
@@ -6370,7 +6370,7 @@
           <a:p>
             <a:fld id="{46878720-212C-42BB-B356-99628BFE1EBF}" type="datetimeFigureOut">
               <a:rPr lang="en-US" smtClean="0"/>
-              <a:t>2/14/22</a:t>
+              <a:t>2/28/22</a:t>
             </a:fld>
             <a:endParaRPr lang="en-US"/>
           </a:p>
@@ -9468,7 +9468,7 @@
           <a:graphicData uri="http://schemas.openxmlformats.org/presentationml/2006/ole">
             <mc:AlternateContent xmlns:mc="http://schemas.openxmlformats.org/markup-compatibility/2006">
               <mc:Choice xmlns:v="urn:schemas-microsoft-com:vml" Requires="v">
-                <p:oleObj spid="_x0000_s4148" name="Formel" r:id="rId3" imgW="76073000" imgH="9067800" progId="Equation.3">
+                <p:oleObj spid="_x0000_s4154" name="Formel" r:id="rId3" imgW="76073000" imgH="9067800" progId="Equation.3">
                   <p:embed/>
                 </p:oleObj>
               </mc:Choice>
@@ -9711,7 +9711,7 @@
           <a:graphicData uri="http://schemas.openxmlformats.org/presentationml/2006/ole">
             <mc:AlternateContent xmlns:mc="http://schemas.openxmlformats.org/markup-compatibility/2006">
               <mc:Choice xmlns:v="urn:schemas-microsoft-com:vml" Requires="v">
-                <p:oleObj spid="_x0000_s4149" name="Formel" r:id="rId5" imgW="48564800" imgH="9652000" progId="Equation.3">
+                <p:oleObj spid="_x0000_s4155" name="Formel" r:id="rId5" imgW="48564800" imgH="9652000" progId="Equation.3">
                   <p:embed/>
                 </p:oleObj>
               </mc:Choice>
@@ -9954,7 +9954,7 @@
           <a:graphicData uri="http://schemas.openxmlformats.org/presentationml/2006/ole">
             <mc:AlternateContent xmlns:mc="http://schemas.openxmlformats.org/markup-compatibility/2006">
               <mc:Choice xmlns:v="urn:schemas-microsoft-com:vml" Requires="v">
-                <p:oleObj spid="_x0000_s4150" name="Formel" r:id="rId7" imgW="8483600" imgH="9067800" progId="Equation.3">
+                <p:oleObj spid="_x0000_s4156" name="Formel" r:id="rId7" imgW="8483600" imgH="9067800" progId="Equation.3">
                   <p:embed/>
                 </p:oleObj>
               </mc:Choice>
@@ -10303,6 +10303,405 @@
           </a:prstGeom>
         </p:spPr>
       </p:pic>
+      <p:sp>
+        <p:nvSpPr>
+          <p:cNvPr id="3" name="Textfeld 2">
+            <a:extLst>
+              <a:ext uri="{FF2B5EF4-FFF2-40B4-BE49-F238E27FC236}">
+                <a16:creationId xmlns:a16="http://schemas.microsoft.com/office/drawing/2014/main" id="{779C8823-0E72-304A-8D0A-0653009C1F28}"/>
+              </a:ext>
+            </a:extLst>
+          </p:cNvPr>
+          <p:cNvSpPr txBox="1"/>
+          <p:nvPr/>
+        </p:nvSpPr>
+        <p:spPr>
+          <a:xfrm>
+            <a:off x="1043609" y="3989774"/>
+            <a:ext cx="418704" cy="307777"/>
+          </a:xfrm>
+          <a:prstGeom prst="rect">
+            <a:avLst/>
+          </a:prstGeom>
+          <a:noFill/>
+        </p:spPr>
+        <p:txBody>
+          <a:bodyPr wrap="none" rtlCol="0">
+            <a:spAutoFit/>
+          </a:bodyPr>
+          <a:lstStyle/>
+          <a:p>
+            <a:r>
+              <a:rPr lang="de-DE" sz="1400" dirty="0"/>
+              <a:t>9 V</a:t>
+            </a:r>
+          </a:p>
+        </p:txBody>
+      </p:sp>
+      <p:sp>
+        <p:nvSpPr>
+          <p:cNvPr id="9" name="Textfeld 8">
+            <a:extLst>
+              <a:ext uri="{FF2B5EF4-FFF2-40B4-BE49-F238E27FC236}">
+                <a16:creationId xmlns:a16="http://schemas.microsoft.com/office/drawing/2014/main" id="{4B37CE10-817D-DE4D-8DF2-D31E9A9284E5}"/>
+              </a:ext>
+            </a:extLst>
+          </p:cNvPr>
+          <p:cNvSpPr txBox="1"/>
+          <p:nvPr/>
+        </p:nvSpPr>
+        <p:spPr>
+          <a:xfrm>
+            <a:off x="6448136" y="3641563"/>
+            <a:ext cx="4574359" cy="307777"/>
+          </a:xfrm>
+          <a:prstGeom prst="rect">
+            <a:avLst/>
+          </a:prstGeom>
+          <a:noFill/>
+        </p:spPr>
+        <p:txBody>
+          <a:bodyPr wrap="square" rtlCol="0">
+            <a:spAutoFit/>
+          </a:bodyPr>
+          <a:lstStyle/>
+          <a:p>
+            <a:r>
+              <a:rPr lang="de-DE" sz="1400" dirty="0"/>
+              <a:t>9 V        =       1,5 V               +       3 V               +  4,5 V         </a:t>
+            </a:r>
+          </a:p>
+        </p:txBody>
+      </p:sp>
+      <p:sp>
+        <p:nvSpPr>
+          <p:cNvPr id="11" name="Textfeld 10">
+            <a:extLst>
+              <a:ext uri="{FF2B5EF4-FFF2-40B4-BE49-F238E27FC236}">
+                <a16:creationId xmlns:a16="http://schemas.microsoft.com/office/drawing/2014/main" id="{B7E88523-7474-2D45-9ECB-9D88B5B97321}"/>
+              </a:ext>
+            </a:extLst>
+          </p:cNvPr>
+          <p:cNvSpPr txBox="1"/>
+          <p:nvPr/>
+        </p:nvSpPr>
+        <p:spPr>
+          <a:xfrm>
+            <a:off x="1496983" y="2942701"/>
+            <a:ext cx="808895" cy="307777"/>
+          </a:xfrm>
+          <a:prstGeom prst="rect">
+            <a:avLst/>
+          </a:prstGeom>
+          <a:noFill/>
+        </p:spPr>
+        <p:txBody>
+          <a:bodyPr wrap="square" rtlCol="0">
+            <a:spAutoFit/>
+          </a:bodyPr>
+          <a:lstStyle/>
+          <a:p>
+            <a:r>
+              <a:rPr lang="de-DE" sz="1400" dirty="0"/>
+              <a:t>100 </a:t>
+            </a:r>
+            <a:r>
+              <a:rPr lang="el-GR" sz="1400" dirty="0"/>
+              <a:t>Ω</a:t>
+            </a:r>
+            <a:endParaRPr lang="de-DE" sz="1400" dirty="0"/>
+          </a:p>
+        </p:txBody>
+      </p:sp>
+      <p:sp>
+        <p:nvSpPr>
+          <p:cNvPr id="12" name="Textfeld 11">
+            <a:extLst>
+              <a:ext uri="{FF2B5EF4-FFF2-40B4-BE49-F238E27FC236}">
+                <a16:creationId xmlns:a16="http://schemas.microsoft.com/office/drawing/2014/main" id="{F2DEF49D-6FCF-F446-9555-340FCE13EADB}"/>
+              </a:ext>
+            </a:extLst>
+          </p:cNvPr>
+          <p:cNvSpPr txBox="1"/>
+          <p:nvPr/>
+        </p:nvSpPr>
+        <p:spPr>
+          <a:xfrm>
+            <a:off x="1559640" y="4096035"/>
+            <a:ext cx="808895" cy="307777"/>
+          </a:xfrm>
+          <a:prstGeom prst="rect">
+            <a:avLst/>
+          </a:prstGeom>
+          <a:noFill/>
+        </p:spPr>
+        <p:txBody>
+          <a:bodyPr wrap="square" rtlCol="0">
+            <a:spAutoFit/>
+          </a:bodyPr>
+          <a:lstStyle/>
+          <a:p>
+            <a:r>
+              <a:rPr lang="de-DE" sz="1400" dirty="0"/>
+              <a:t>200 </a:t>
+            </a:r>
+            <a:r>
+              <a:rPr lang="el-GR" sz="1400" dirty="0"/>
+              <a:t>Ω</a:t>
+            </a:r>
+            <a:endParaRPr lang="de-DE" sz="1400" dirty="0"/>
+          </a:p>
+        </p:txBody>
+      </p:sp>
+      <p:sp>
+        <p:nvSpPr>
+          <p:cNvPr id="13" name="Textfeld 12">
+            <a:extLst>
+              <a:ext uri="{FF2B5EF4-FFF2-40B4-BE49-F238E27FC236}">
+                <a16:creationId xmlns:a16="http://schemas.microsoft.com/office/drawing/2014/main" id="{B0B49426-9C13-F14A-9F57-D434ACA0F9EF}"/>
+              </a:ext>
+            </a:extLst>
+          </p:cNvPr>
+          <p:cNvSpPr txBox="1"/>
+          <p:nvPr/>
+        </p:nvSpPr>
+        <p:spPr>
+          <a:xfrm>
+            <a:off x="1559640" y="5249369"/>
+            <a:ext cx="808895" cy="307777"/>
+          </a:xfrm>
+          <a:prstGeom prst="rect">
+            <a:avLst/>
+          </a:prstGeom>
+          <a:noFill/>
+        </p:spPr>
+        <p:txBody>
+          <a:bodyPr wrap="square" rtlCol="0">
+            <a:spAutoFit/>
+          </a:bodyPr>
+          <a:lstStyle/>
+          <a:p>
+            <a:r>
+              <a:rPr lang="de-DE" sz="1400" dirty="0"/>
+              <a:t>300 </a:t>
+            </a:r>
+            <a:r>
+              <a:rPr lang="el-GR" sz="1400" dirty="0"/>
+              <a:t>Ω</a:t>
+            </a:r>
+            <a:endParaRPr lang="de-DE" sz="1400" dirty="0"/>
+          </a:p>
+        </p:txBody>
+      </p:sp>
+      <p:sp>
+        <p:nvSpPr>
+          <p:cNvPr id="14" name="Textfeld 13">
+            <a:extLst>
+              <a:ext uri="{FF2B5EF4-FFF2-40B4-BE49-F238E27FC236}">
+                <a16:creationId xmlns:a16="http://schemas.microsoft.com/office/drawing/2014/main" id="{808CAE19-9737-EB4E-94F4-5D71E5532589}"/>
+              </a:ext>
+            </a:extLst>
+          </p:cNvPr>
+          <p:cNvSpPr txBox="1"/>
+          <p:nvPr/>
+        </p:nvSpPr>
+        <p:spPr>
+          <a:xfrm>
+            <a:off x="5179022" y="3788258"/>
+            <a:ext cx="808895" cy="307777"/>
+          </a:xfrm>
+          <a:prstGeom prst="rect">
+            <a:avLst/>
+          </a:prstGeom>
+          <a:noFill/>
+        </p:spPr>
+        <p:txBody>
+          <a:bodyPr wrap="square" rtlCol="0">
+            <a:spAutoFit/>
+          </a:bodyPr>
+          <a:lstStyle/>
+          <a:p>
+            <a:r>
+              <a:rPr lang="de-DE" sz="1400" dirty="0"/>
+              <a:t>600 </a:t>
+            </a:r>
+            <a:r>
+              <a:rPr lang="el-GR" sz="1400" dirty="0"/>
+              <a:t>Ω</a:t>
+            </a:r>
+            <a:endParaRPr lang="de-DE" sz="1400" dirty="0"/>
+          </a:p>
+        </p:txBody>
+      </p:sp>
+      <p:sp>
+        <p:nvSpPr>
+          <p:cNvPr id="15" name="Textfeld 14">
+            <a:extLst>
+              <a:ext uri="{FF2B5EF4-FFF2-40B4-BE49-F238E27FC236}">
+                <a16:creationId xmlns:a16="http://schemas.microsoft.com/office/drawing/2014/main" id="{6BB4CCC9-3914-9F47-AC2C-17A2EF544DBE}"/>
+              </a:ext>
+            </a:extLst>
+          </p:cNvPr>
+          <p:cNvSpPr txBox="1"/>
+          <p:nvPr/>
+        </p:nvSpPr>
+        <p:spPr>
+          <a:xfrm>
+            <a:off x="3968473" y="4008697"/>
+            <a:ext cx="418704" cy="307777"/>
+          </a:xfrm>
+          <a:prstGeom prst="rect">
+            <a:avLst/>
+          </a:prstGeom>
+          <a:noFill/>
+        </p:spPr>
+        <p:txBody>
+          <a:bodyPr wrap="none" rtlCol="0">
+            <a:spAutoFit/>
+          </a:bodyPr>
+          <a:lstStyle/>
+          <a:p>
+            <a:r>
+              <a:rPr lang="de-DE" sz="1400" dirty="0"/>
+              <a:t>9 V</a:t>
+            </a:r>
+          </a:p>
+        </p:txBody>
+      </p:sp>
+      <p:sp>
+        <p:nvSpPr>
+          <p:cNvPr id="16" name="Textfeld 15">
+            <a:extLst>
+              <a:ext uri="{FF2B5EF4-FFF2-40B4-BE49-F238E27FC236}">
+                <a16:creationId xmlns:a16="http://schemas.microsoft.com/office/drawing/2014/main" id="{1F3DF4EE-A435-B447-9872-FCBECD392DF2}"/>
+              </a:ext>
+            </a:extLst>
+          </p:cNvPr>
+          <p:cNvSpPr txBox="1"/>
+          <p:nvPr/>
+        </p:nvSpPr>
+        <p:spPr>
+          <a:xfrm>
+            <a:off x="6671359" y="5110996"/>
+            <a:ext cx="4574359" cy="369332"/>
+          </a:xfrm>
+          <a:prstGeom prst="rect">
+            <a:avLst/>
+          </a:prstGeom>
+          <a:noFill/>
+        </p:spPr>
+        <p:txBody>
+          <a:bodyPr wrap="square" rtlCol="0">
+            <a:spAutoFit/>
+          </a:bodyPr>
+          <a:lstStyle/>
+          <a:p>
+            <a:r>
+              <a:rPr lang="de-DE" sz="1400" dirty="0"/>
+              <a:t>600 </a:t>
+            </a:r>
+            <a:r>
+              <a:rPr lang="el-GR" dirty="0"/>
+              <a:t>Ω</a:t>
+            </a:r>
+            <a:r>
+              <a:rPr lang="de-DE" dirty="0"/>
+              <a:t>   =   100</a:t>
+            </a:r>
+            <a:r>
+              <a:rPr lang="el-GR" dirty="0"/>
+              <a:t>Ω</a:t>
+            </a:r>
+            <a:r>
+              <a:rPr lang="de-DE" dirty="0"/>
+              <a:t> + 200</a:t>
+            </a:r>
+            <a:r>
+              <a:rPr lang="el-GR" dirty="0"/>
+              <a:t>Ω</a:t>
+            </a:r>
+            <a:r>
+              <a:rPr lang="de-DE" dirty="0"/>
+              <a:t> + 300</a:t>
+            </a:r>
+            <a:r>
+              <a:rPr lang="el-GR" dirty="0"/>
+              <a:t>Ω</a:t>
+            </a:r>
+            <a:endParaRPr lang="de-DE" sz="1400" dirty="0"/>
+          </a:p>
+        </p:txBody>
+      </p:sp>
+      <p:sp>
+        <p:nvSpPr>
+          <p:cNvPr id="18" name="Textfeld 17">
+            <a:extLst>
+              <a:ext uri="{FF2B5EF4-FFF2-40B4-BE49-F238E27FC236}">
+                <a16:creationId xmlns:a16="http://schemas.microsoft.com/office/drawing/2014/main" id="{27C312BD-7545-A846-B45A-477412F3A18A}"/>
+              </a:ext>
+            </a:extLst>
+          </p:cNvPr>
+          <p:cNvSpPr txBox="1"/>
+          <p:nvPr/>
+        </p:nvSpPr>
+        <p:spPr>
+          <a:xfrm>
+            <a:off x="1901430" y="1959578"/>
+            <a:ext cx="808895" cy="307777"/>
+          </a:xfrm>
+          <a:prstGeom prst="rect">
+            <a:avLst/>
+          </a:prstGeom>
+          <a:noFill/>
+        </p:spPr>
+        <p:txBody>
+          <a:bodyPr wrap="square" rtlCol="0">
+            <a:spAutoFit/>
+          </a:bodyPr>
+          <a:lstStyle/>
+          <a:p>
+            <a:r>
+              <a:rPr lang="de-DE" sz="1400" dirty="0"/>
+              <a:t>15 mA</a:t>
+            </a:r>
+          </a:p>
+        </p:txBody>
+      </p:sp>
+      <p:sp>
+        <p:nvSpPr>
+          <p:cNvPr id="19" name="Textfeld 18">
+            <a:extLst>
+              <a:ext uri="{FF2B5EF4-FFF2-40B4-BE49-F238E27FC236}">
+                <a16:creationId xmlns:a16="http://schemas.microsoft.com/office/drawing/2014/main" id="{FDF71469-7F8E-8C4E-A66A-243A0BAD35EB}"/>
+              </a:ext>
+            </a:extLst>
+          </p:cNvPr>
+          <p:cNvSpPr txBox="1"/>
+          <p:nvPr/>
+        </p:nvSpPr>
+        <p:spPr>
+          <a:xfrm>
+            <a:off x="4953019" y="1871184"/>
+            <a:ext cx="808895" cy="307777"/>
+          </a:xfrm>
+          <a:prstGeom prst="rect">
+            <a:avLst/>
+          </a:prstGeom>
+          <a:noFill/>
+        </p:spPr>
+        <p:txBody>
+          <a:bodyPr wrap="square" rtlCol="0">
+            <a:spAutoFit/>
+          </a:bodyPr>
+          <a:lstStyle/>
+          <a:p>
+            <a:r>
+              <a:rPr lang="de-DE" sz="1400" dirty="0"/>
+              <a:t>15 mA</a:t>
+            </a:r>
+          </a:p>
+        </p:txBody>
+      </p:sp>
     </p:spTree>
     <p:extLst>
       <p:ext uri="{BB962C8B-B14F-4D97-AF65-F5344CB8AC3E}">
@@ -10518,6 +10917,336 @@
           </a:prstGeom>
         </p:spPr>
       </p:pic>
+      <p:sp>
+        <p:nvSpPr>
+          <p:cNvPr id="6" name="Textfeld 5">
+            <a:extLst>
+              <a:ext uri="{FF2B5EF4-FFF2-40B4-BE49-F238E27FC236}">
+                <a16:creationId xmlns:a16="http://schemas.microsoft.com/office/drawing/2014/main" id="{FCDE36F8-954C-1848-9D2C-7128FCF06EE5}"/>
+              </a:ext>
+            </a:extLst>
+          </p:cNvPr>
+          <p:cNvSpPr txBox="1"/>
+          <p:nvPr/>
+        </p:nvSpPr>
+        <p:spPr>
+          <a:xfrm>
+            <a:off x="2570409" y="3837223"/>
+            <a:ext cx="808895" cy="307777"/>
+          </a:xfrm>
+          <a:prstGeom prst="rect">
+            <a:avLst/>
+          </a:prstGeom>
+          <a:noFill/>
+        </p:spPr>
+        <p:txBody>
+          <a:bodyPr wrap="square" rtlCol="0">
+            <a:spAutoFit/>
+          </a:bodyPr>
+          <a:lstStyle/>
+          <a:p>
+            <a:r>
+              <a:rPr lang="de-DE" sz="1400" dirty="0"/>
+              <a:t>100 </a:t>
+            </a:r>
+            <a:r>
+              <a:rPr lang="el-GR" sz="1400" dirty="0"/>
+              <a:t>Ω</a:t>
+            </a:r>
+            <a:endParaRPr lang="de-DE" sz="1400" dirty="0"/>
+          </a:p>
+        </p:txBody>
+      </p:sp>
+      <p:sp>
+        <p:nvSpPr>
+          <p:cNvPr id="7" name="Textfeld 6">
+            <a:extLst>
+              <a:ext uri="{FF2B5EF4-FFF2-40B4-BE49-F238E27FC236}">
+                <a16:creationId xmlns:a16="http://schemas.microsoft.com/office/drawing/2014/main" id="{95C11072-DD80-2845-9027-21F9775D7E25}"/>
+              </a:ext>
+            </a:extLst>
+          </p:cNvPr>
+          <p:cNvSpPr txBox="1"/>
+          <p:nvPr/>
+        </p:nvSpPr>
+        <p:spPr>
+          <a:xfrm>
+            <a:off x="4516302" y="3837223"/>
+            <a:ext cx="808895" cy="307777"/>
+          </a:xfrm>
+          <a:prstGeom prst="rect">
+            <a:avLst/>
+          </a:prstGeom>
+          <a:noFill/>
+        </p:spPr>
+        <p:txBody>
+          <a:bodyPr wrap="square" rtlCol="0">
+            <a:spAutoFit/>
+          </a:bodyPr>
+          <a:lstStyle/>
+          <a:p>
+            <a:r>
+              <a:rPr lang="de-DE" sz="1400" dirty="0"/>
+              <a:t>200 </a:t>
+            </a:r>
+            <a:r>
+              <a:rPr lang="el-GR" sz="1400" dirty="0"/>
+              <a:t>Ω</a:t>
+            </a:r>
+            <a:endParaRPr lang="de-DE" sz="1400" dirty="0"/>
+          </a:p>
+        </p:txBody>
+      </p:sp>
+      <p:sp>
+        <p:nvSpPr>
+          <p:cNvPr id="8" name="Textfeld 7">
+            <a:extLst>
+              <a:ext uri="{FF2B5EF4-FFF2-40B4-BE49-F238E27FC236}">
+                <a16:creationId xmlns:a16="http://schemas.microsoft.com/office/drawing/2014/main" id="{F107801F-5A1F-2443-80E3-D834322FC237}"/>
+              </a:ext>
+            </a:extLst>
+          </p:cNvPr>
+          <p:cNvSpPr txBox="1"/>
+          <p:nvPr/>
+        </p:nvSpPr>
+        <p:spPr>
+          <a:xfrm>
+            <a:off x="6310544" y="3917526"/>
+            <a:ext cx="808895" cy="307777"/>
+          </a:xfrm>
+          <a:prstGeom prst="rect">
+            <a:avLst/>
+          </a:prstGeom>
+          <a:noFill/>
+        </p:spPr>
+        <p:txBody>
+          <a:bodyPr wrap="square" rtlCol="0">
+            <a:spAutoFit/>
+          </a:bodyPr>
+          <a:lstStyle/>
+          <a:p>
+            <a:r>
+              <a:rPr lang="de-DE" sz="1400" dirty="0"/>
+              <a:t>300 </a:t>
+            </a:r>
+            <a:r>
+              <a:rPr lang="el-GR" sz="1400" dirty="0"/>
+              <a:t>Ω</a:t>
+            </a:r>
+            <a:endParaRPr lang="de-DE" sz="1400" dirty="0"/>
+          </a:p>
+        </p:txBody>
+      </p:sp>
+      <p:sp>
+        <p:nvSpPr>
+          <p:cNvPr id="10" name="Textfeld 9">
+            <a:extLst>
+              <a:ext uri="{FF2B5EF4-FFF2-40B4-BE49-F238E27FC236}">
+                <a16:creationId xmlns:a16="http://schemas.microsoft.com/office/drawing/2014/main" id="{0F7904F9-74AF-504C-9133-98BDE56D228B}"/>
+              </a:ext>
+            </a:extLst>
+          </p:cNvPr>
+          <p:cNvSpPr txBox="1"/>
+          <p:nvPr/>
+        </p:nvSpPr>
+        <p:spPr>
+          <a:xfrm>
+            <a:off x="476733" y="3869339"/>
+            <a:ext cx="418704" cy="307777"/>
+          </a:xfrm>
+          <a:prstGeom prst="rect">
+            <a:avLst/>
+          </a:prstGeom>
+          <a:noFill/>
+        </p:spPr>
+        <p:txBody>
+          <a:bodyPr wrap="none" rtlCol="0">
+            <a:spAutoFit/>
+          </a:bodyPr>
+          <a:lstStyle/>
+          <a:p>
+            <a:r>
+              <a:rPr lang="de-DE" sz="1400" dirty="0"/>
+              <a:t>9 V</a:t>
+            </a:r>
+          </a:p>
+        </p:txBody>
+      </p:sp>
+      <p:sp>
+        <p:nvSpPr>
+          <p:cNvPr id="13" name="Textfeld 12">
+            <a:extLst>
+              <a:ext uri="{FF2B5EF4-FFF2-40B4-BE49-F238E27FC236}">
+                <a16:creationId xmlns:a16="http://schemas.microsoft.com/office/drawing/2014/main" id="{ACE7FE02-6419-E142-B304-C2C2FE1D77CA}"/>
+              </a:ext>
+            </a:extLst>
+          </p:cNvPr>
+          <p:cNvSpPr txBox="1"/>
+          <p:nvPr/>
+        </p:nvSpPr>
+        <p:spPr>
+          <a:xfrm>
+            <a:off x="2580348" y="3193823"/>
+            <a:ext cx="808895" cy="307777"/>
+          </a:xfrm>
+          <a:prstGeom prst="rect">
+            <a:avLst/>
+          </a:prstGeom>
+          <a:noFill/>
+        </p:spPr>
+        <p:txBody>
+          <a:bodyPr wrap="square" rtlCol="0">
+            <a:spAutoFit/>
+          </a:bodyPr>
+          <a:lstStyle/>
+          <a:p>
+            <a:r>
+              <a:rPr lang="de-DE" sz="1400" dirty="0"/>
+              <a:t>90 mA</a:t>
+            </a:r>
+          </a:p>
+        </p:txBody>
+      </p:sp>
+      <p:sp>
+        <p:nvSpPr>
+          <p:cNvPr id="14" name="Textfeld 13">
+            <a:extLst>
+              <a:ext uri="{FF2B5EF4-FFF2-40B4-BE49-F238E27FC236}">
+                <a16:creationId xmlns:a16="http://schemas.microsoft.com/office/drawing/2014/main" id="{46D11910-5EFC-D248-9644-D0E8E8AAB3CB}"/>
+              </a:ext>
+            </a:extLst>
+          </p:cNvPr>
+          <p:cNvSpPr txBox="1"/>
+          <p:nvPr/>
+        </p:nvSpPr>
+        <p:spPr>
+          <a:xfrm>
+            <a:off x="4516302" y="3120504"/>
+            <a:ext cx="730538" cy="307777"/>
+          </a:xfrm>
+          <a:prstGeom prst="rect">
+            <a:avLst/>
+          </a:prstGeom>
+          <a:noFill/>
+        </p:spPr>
+        <p:txBody>
+          <a:bodyPr wrap="square" rtlCol="0">
+            <a:spAutoFit/>
+          </a:bodyPr>
+          <a:lstStyle/>
+          <a:p>
+            <a:r>
+              <a:rPr lang="de-DE" sz="1400" dirty="0"/>
+              <a:t>45 mA</a:t>
+            </a:r>
+          </a:p>
+        </p:txBody>
+      </p:sp>
+      <p:sp>
+        <p:nvSpPr>
+          <p:cNvPr id="15" name="Textfeld 14">
+            <a:extLst>
+              <a:ext uri="{FF2B5EF4-FFF2-40B4-BE49-F238E27FC236}">
+                <a16:creationId xmlns:a16="http://schemas.microsoft.com/office/drawing/2014/main" id="{A1D7AFF2-90D8-6246-9976-B2492040C86D}"/>
+              </a:ext>
+            </a:extLst>
+          </p:cNvPr>
+          <p:cNvSpPr txBox="1"/>
+          <p:nvPr/>
+        </p:nvSpPr>
+        <p:spPr>
+          <a:xfrm>
+            <a:off x="6299584" y="3166277"/>
+            <a:ext cx="730538" cy="307777"/>
+          </a:xfrm>
+          <a:prstGeom prst="rect">
+            <a:avLst/>
+          </a:prstGeom>
+          <a:noFill/>
+        </p:spPr>
+        <p:txBody>
+          <a:bodyPr wrap="square" rtlCol="0">
+            <a:spAutoFit/>
+          </a:bodyPr>
+          <a:lstStyle/>
+          <a:p>
+            <a:r>
+              <a:rPr lang="de-DE" sz="1400" dirty="0"/>
+              <a:t>30 mA</a:t>
+            </a:r>
+          </a:p>
+        </p:txBody>
+      </p:sp>
+      <p:sp>
+        <p:nvSpPr>
+          <p:cNvPr id="16" name="Textfeld 15">
+            <a:extLst>
+              <a:ext uri="{FF2B5EF4-FFF2-40B4-BE49-F238E27FC236}">
+                <a16:creationId xmlns:a16="http://schemas.microsoft.com/office/drawing/2014/main" id="{25838186-A215-B54A-99E1-D3088B2EC0D1}"/>
+              </a:ext>
+            </a:extLst>
+          </p:cNvPr>
+          <p:cNvSpPr txBox="1"/>
+          <p:nvPr/>
+        </p:nvSpPr>
+        <p:spPr>
+          <a:xfrm>
+            <a:off x="7617641" y="3886748"/>
+            <a:ext cx="4574359" cy="307777"/>
+          </a:xfrm>
+          <a:prstGeom prst="rect">
+            <a:avLst/>
+          </a:prstGeom>
+          <a:noFill/>
+        </p:spPr>
+        <p:txBody>
+          <a:bodyPr wrap="square" rtlCol="0">
+            <a:spAutoFit/>
+          </a:bodyPr>
+          <a:lstStyle/>
+          <a:p>
+            <a:r>
+              <a:rPr lang="de-DE" sz="1400" dirty="0"/>
+              <a:t>165mA = 90mA  + 45mA     +   30mA</a:t>
+            </a:r>
+          </a:p>
+        </p:txBody>
+      </p:sp>
+      <p:sp>
+        <p:nvSpPr>
+          <p:cNvPr id="17" name="Textfeld 16">
+            <a:extLst>
+              <a:ext uri="{FF2B5EF4-FFF2-40B4-BE49-F238E27FC236}">
+                <a16:creationId xmlns:a16="http://schemas.microsoft.com/office/drawing/2014/main" id="{909D68E7-551F-7849-8803-ABB2FAFB4DC4}"/>
+              </a:ext>
+            </a:extLst>
+          </p:cNvPr>
+          <p:cNvSpPr txBox="1"/>
+          <p:nvPr/>
+        </p:nvSpPr>
+        <p:spPr>
+          <a:xfrm>
+            <a:off x="1887922" y="1983075"/>
+            <a:ext cx="808895" cy="307777"/>
+          </a:xfrm>
+          <a:prstGeom prst="rect">
+            <a:avLst/>
+          </a:prstGeom>
+          <a:noFill/>
+        </p:spPr>
+        <p:txBody>
+          <a:bodyPr wrap="square" rtlCol="0">
+            <a:spAutoFit/>
+          </a:bodyPr>
+          <a:lstStyle/>
+          <a:p>
+            <a:r>
+              <a:rPr lang="de-DE" sz="1400" dirty="0"/>
+              <a:t>165 mA</a:t>
+            </a:r>
+          </a:p>
+        </p:txBody>
+      </p:sp>
     </p:spTree>
     <p:extLst>
       <p:ext uri="{BB962C8B-B14F-4D97-AF65-F5344CB8AC3E}">
@@ -12057,6 +12786,12 @@
 </file>
 
 <file path=customXml/item1.xml><?xml version="1.0" encoding="utf-8"?>
+<p:properties xmlns:p="http://schemas.microsoft.com/office/2006/metadata/properties" xmlns:xsi="http://www.w3.org/2001/XMLSchema-instance" xmlns:pc="http://schemas.microsoft.com/office/infopath/2007/PartnerControls">
+  <documentManagement/>
+</p:properties>
+</file>
+
+<file path=customXml/item2.xml><?xml version="1.0" encoding="utf-8"?>
 <ct:contentTypeSchema xmlns:ct="http://schemas.microsoft.com/office/2006/metadata/contentType" xmlns:ma="http://schemas.microsoft.com/office/2006/metadata/properties/metaAttributes" ct:_="" ma:_="" ma:contentTypeName="Document" ma:contentTypeID="0x010100B4B9B92454B73847AA0367335585965E" ma:contentTypeVersion="12" ma:contentTypeDescription="Create a new document." ma:contentTypeScope="" ma:versionID="e03bd757301da460c704f3115d541a61">
   <xsd:schema xmlns:xsd="http://www.w3.org/2001/XMLSchema" xmlns:xs="http://www.w3.org/2001/XMLSchema" xmlns:p="http://schemas.microsoft.com/office/2006/metadata/properties" xmlns:ns2="7e0397fa-c04e-494e-b1f1-774ad14ae133" xmlns:ns3="8413540a-1bb6-4053-94a1-f89835fea1c0" targetNamespace="http://schemas.microsoft.com/office/2006/metadata/properties" ma:root="true" ma:fieldsID="8a43826bbb8ef7d01dc3ce4144ed7f57" ns2:_="" ns3:_="">
     <xsd:import namespace="7e0397fa-c04e-494e-b1f1-774ad14ae133"/>
@@ -12273,12 +13008,6 @@
 </ct:contentTypeSchema>
 </file>
 
-<file path=customXml/item2.xml><?xml version="1.0" encoding="utf-8"?>
-<p:properties xmlns:p="http://schemas.microsoft.com/office/2006/metadata/properties" xmlns:xsi="http://www.w3.org/2001/XMLSchema-instance" xmlns:pc="http://schemas.microsoft.com/office/infopath/2007/PartnerControls">
-  <documentManagement/>
-</p:properties>
-</file>
-
 <file path=customXml/item3.xml><?xml version="1.0" encoding="utf-8"?>
 <?mso-contentType ?>
 <FormTemplates xmlns="http://schemas.microsoft.com/sharepoint/v3/contenttype/forms">
@@ -12289,6 +13018,23 @@
 </file>
 
 <file path=customXml/itemProps1.xml><?xml version="1.0" encoding="utf-8"?>
+<ds:datastoreItem xmlns:ds="http://schemas.openxmlformats.org/officeDocument/2006/customXml" ds:itemID="{68B22CCF-3790-4DAF-9B94-BBE8105DACDB}">
+  <ds:schemaRefs>
+    <ds:schemaRef ds:uri="http://purl.org/dc/elements/1.1/"/>
+    <ds:schemaRef ds:uri="http://schemas.openxmlformats.org/package/2006/metadata/core-properties"/>
+    <ds:schemaRef ds:uri="http://schemas.microsoft.com/office/2006/documentManagement/types"/>
+    <ds:schemaRef ds:uri="7e0397fa-c04e-494e-b1f1-774ad14ae133"/>
+    <ds:schemaRef ds:uri="http://www.w3.org/XML/1998/namespace"/>
+    <ds:schemaRef ds:uri="http://schemas.microsoft.com/office/infopath/2007/PartnerControls"/>
+    <ds:schemaRef ds:uri="http://purl.org/dc/dcmitype/"/>
+    <ds:schemaRef ds:uri="8413540a-1bb6-4053-94a1-f89835fea1c0"/>
+    <ds:schemaRef ds:uri="http://schemas.microsoft.com/office/2006/metadata/properties"/>
+    <ds:schemaRef ds:uri="http://purl.org/dc/terms/"/>
+  </ds:schemaRefs>
+</ds:datastoreItem>
+</file>
+
+<file path=customXml/itemProps2.xml><?xml version="1.0" encoding="utf-8"?>
 <ds:datastoreItem xmlns:ds="http://schemas.openxmlformats.org/officeDocument/2006/customXml" ds:itemID="{A66B1A69-4B86-4CD0-9260-0F88A0083DD6}">
   <ds:schemaRefs>
     <ds:schemaRef ds:uri="http://schemas.microsoft.com/office/2006/metadata/contentType"/>
@@ -12307,23 +13053,6 @@
 </ds:datastoreItem>
 </file>
 
-<file path=customXml/itemProps2.xml><?xml version="1.0" encoding="utf-8"?>
-<ds:datastoreItem xmlns:ds="http://schemas.openxmlformats.org/officeDocument/2006/customXml" ds:itemID="{68B22CCF-3790-4DAF-9B94-BBE8105DACDB}">
-  <ds:schemaRefs>
-    <ds:schemaRef ds:uri="http://purl.org/dc/elements/1.1/"/>
-    <ds:schemaRef ds:uri="http://schemas.openxmlformats.org/package/2006/metadata/core-properties"/>
-    <ds:schemaRef ds:uri="http://schemas.microsoft.com/office/2006/documentManagement/types"/>
-    <ds:schemaRef ds:uri="7e0397fa-c04e-494e-b1f1-774ad14ae133"/>
-    <ds:schemaRef ds:uri="http://www.w3.org/XML/1998/namespace"/>
-    <ds:schemaRef ds:uri="http://schemas.microsoft.com/office/infopath/2007/PartnerControls"/>
-    <ds:schemaRef ds:uri="http://purl.org/dc/dcmitype/"/>
-    <ds:schemaRef ds:uri="8413540a-1bb6-4053-94a1-f89835fea1c0"/>
-    <ds:schemaRef ds:uri="http://schemas.microsoft.com/office/2006/metadata/properties"/>
-    <ds:schemaRef ds:uri="http://purl.org/dc/terms/"/>
-  </ds:schemaRefs>
-</ds:datastoreItem>
-</file>
-
 <file path=customXml/itemProps3.xml><?xml version="1.0" encoding="utf-8"?>
 <ds:datastoreItem xmlns:ds="http://schemas.openxmlformats.org/officeDocument/2006/customXml" ds:itemID="{19285E5B-5F99-40AB-B4B4-B67FE3E29063}">
   <ds:schemaRefs>

</xml_diff>

<commit_message>
interaktive Fragen und kleinere Korrekturen
</commit_message>
<xml_diff>
--- a/Folien/Exkurs_Elektrotechnik.pptx
+++ b/Folien/Exkurs_Elektrotechnik.pptx
@@ -6,36 +6,37 @@
     <p:sldMasterId id="2147483660" r:id="rId5"/>
   </p:sldMasterIdLst>
   <p:notesMasterIdLst>
-    <p:notesMasterId r:id="rId33"/>
+    <p:notesMasterId r:id="rId34"/>
   </p:notesMasterIdLst>
   <p:sldIdLst>
     <p:sldId id="291" r:id="rId6"/>
     <p:sldId id="324" r:id="rId7"/>
     <p:sldId id="316" r:id="rId8"/>
-    <p:sldId id="331" r:id="rId9"/>
-    <p:sldId id="326" r:id="rId10"/>
-    <p:sldId id="327" r:id="rId11"/>
-    <p:sldId id="268" r:id="rId12"/>
-    <p:sldId id="328" r:id="rId13"/>
-    <p:sldId id="329" r:id="rId14"/>
-    <p:sldId id="330" r:id="rId15"/>
-    <p:sldId id="317" r:id="rId16"/>
-    <p:sldId id="319" r:id="rId17"/>
-    <p:sldId id="318" r:id="rId18"/>
-    <p:sldId id="320" r:id="rId19"/>
-    <p:sldId id="332" r:id="rId20"/>
-    <p:sldId id="333" r:id="rId21"/>
-    <p:sldId id="334" r:id="rId22"/>
-    <p:sldId id="335" r:id="rId23"/>
-    <p:sldId id="336" r:id="rId24"/>
-    <p:sldId id="337" r:id="rId25"/>
-    <p:sldId id="321" r:id="rId26"/>
-    <p:sldId id="323" r:id="rId27"/>
-    <p:sldId id="322" r:id="rId28"/>
-    <p:sldId id="338" r:id="rId29"/>
-    <p:sldId id="339" r:id="rId30"/>
-    <p:sldId id="340" r:id="rId31"/>
-    <p:sldId id="315" r:id="rId32"/>
+    <p:sldId id="341" r:id="rId9"/>
+    <p:sldId id="331" r:id="rId10"/>
+    <p:sldId id="326" r:id="rId11"/>
+    <p:sldId id="327" r:id="rId12"/>
+    <p:sldId id="268" r:id="rId13"/>
+    <p:sldId id="328" r:id="rId14"/>
+    <p:sldId id="329" r:id="rId15"/>
+    <p:sldId id="330" r:id="rId16"/>
+    <p:sldId id="317" r:id="rId17"/>
+    <p:sldId id="319" r:id="rId18"/>
+    <p:sldId id="318" r:id="rId19"/>
+    <p:sldId id="320" r:id="rId20"/>
+    <p:sldId id="332" r:id="rId21"/>
+    <p:sldId id="333" r:id="rId22"/>
+    <p:sldId id="334" r:id="rId23"/>
+    <p:sldId id="335" r:id="rId24"/>
+    <p:sldId id="336" r:id="rId25"/>
+    <p:sldId id="337" r:id="rId26"/>
+    <p:sldId id="321" r:id="rId27"/>
+    <p:sldId id="323" r:id="rId28"/>
+    <p:sldId id="322" r:id="rId29"/>
+    <p:sldId id="338" r:id="rId30"/>
+    <p:sldId id="339" r:id="rId31"/>
+    <p:sldId id="340" r:id="rId32"/>
+    <p:sldId id="315" r:id="rId33"/>
   </p:sldIdLst>
   <p:sldSz cx="12192000" cy="6858000"/>
   <p:notesSz cx="6858000" cy="9144000"/>
@@ -224,7 +225,7 @@
           <a:p>
             <a:fld id="{1111EAE3-0D17-7D4D-B5C8-7430D3A14508}" type="datetimeFigureOut">
               <a:rPr lang="en-US" smtClean="0"/>
-              <a:t>11/4/22</a:t>
+              <a:t>11/7/22</a:t>
             </a:fld>
             <a:endParaRPr lang="en-US"/>
           </a:p>
@@ -630,7 +631,7 @@
           <a:p>
             <a:r>
               <a:rPr lang="de-DE"/>
-              <a:t>https://www.polleverywhere.com/multiple_choice_polls/LcaC7rJcn1wda6zmC8G9d?display_state=chart&amp;activity_state=closed&amp;display=correctness&amp;state=closed&amp;flow=Instructor&amp;onscreen=persist</a:t>
+              <a:t>https://www.polleverywhere.com/multiple_choice_polls/LcaC7rJcn1wda6zmC8G9d?display_state=chart&amp;activity_state=closed&amp;state=closed&amp;flow=Instructor&amp;onscreen=persist</a:t>
             </a:r>
           </a:p>
         </p:txBody>
@@ -661,7 +662,7 @@
     </p:spTree>
     <p:extLst>
       <p:ext uri="{BB962C8B-B14F-4D97-AF65-F5344CB8AC3E}">
-        <p14:creationId xmlns:p14="http://schemas.microsoft.com/office/powerpoint/2010/main" val="3000281421"/>
+        <p14:creationId xmlns:p14="http://schemas.microsoft.com/office/powerpoint/2010/main" val="2513493308"/>
       </p:ext>
     </p:extLst>
   </p:cSld>
@@ -716,24 +717,16 @@
           <a:lstStyle/>
           <a:p>
             <a:r>
-              <a:rPr lang="de-DE" dirty="0"/>
-              <a:t>Gutes Video zu den </a:t>
-            </a:r>
-            <a:r>
-              <a:rPr lang="de-DE" dirty="0" err="1"/>
-              <a:t>Kirchhoffschen</a:t>
-            </a:r>
-            <a:r>
-              <a:rPr lang="de-DE" dirty="0"/>
-              <a:t> Regeln https://</a:t>
-            </a:r>
-            <a:r>
-              <a:rPr lang="de-DE" dirty="0" err="1"/>
-              <a:t>youtu.be</a:t>
-            </a:r>
-            <a:r>
-              <a:rPr lang="de-DE" dirty="0"/>
-              <a:t>/47Z51oV4Cg4</a:t>
+              <a:rPr lang="de-DE"/>
+              <a:t>Do not modify the notes in this section to avoid tampering with the Poll Everywhere activity.
+More info at polleverywhere.com/support
+Wähle alle richtigen Umformungen des Ohm'schen Gesetzes</a:t>
+            </a:r>
+          </a:p>
+          <a:p>
+            <a:r>
+              <a:rPr lang="de-DE"/>
+              <a:t>https://www.polleverywhere.com/multiple_choice_polls/LcaC7rJcn1wda6zmC8G9d?display_state=chart&amp;activity_state=closed&amp;display=correctness&amp;state=closed&amp;flow=Instructor&amp;onscreen=persist</a:t>
             </a:r>
           </a:p>
         </p:txBody>
@@ -764,7 +757,7 @@
     </p:spTree>
     <p:extLst>
       <p:ext uri="{BB962C8B-B14F-4D97-AF65-F5344CB8AC3E}">
-        <p14:creationId xmlns:p14="http://schemas.microsoft.com/office/powerpoint/2010/main" val="2611406675"/>
+        <p14:creationId xmlns:p14="http://schemas.microsoft.com/office/powerpoint/2010/main" val="3000281421"/>
       </p:ext>
     </p:extLst>
   </p:cSld>
@@ -818,7 +811,26 @@
           <a:bodyPr/>
           <a:lstStyle/>
           <a:p>
-            <a:endParaRPr lang="de-DE"/>
+            <a:r>
+              <a:rPr lang="de-DE" dirty="0"/>
+              <a:t>Gutes Video zu den </a:t>
+            </a:r>
+            <a:r>
+              <a:rPr lang="de-DE" dirty="0" err="1"/>
+              <a:t>Kirchhoffschen</a:t>
+            </a:r>
+            <a:r>
+              <a:rPr lang="de-DE" dirty="0"/>
+              <a:t> Regeln https://</a:t>
+            </a:r>
+            <a:r>
+              <a:rPr lang="de-DE" dirty="0" err="1"/>
+              <a:t>youtu.be</a:t>
+            </a:r>
+            <a:r>
+              <a:rPr lang="de-DE" dirty="0"/>
+              <a:t>/47Z51oV4Cg4</a:t>
+            </a:r>
           </a:p>
         </p:txBody>
       </p:sp>
@@ -848,7 +860,7 @@
     </p:spTree>
     <p:extLst>
       <p:ext uri="{BB962C8B-B14F-4D97-AF65-F5344CB8AC3E}">
-        <p14:creationId xmlns:p14="http://schemas.microsoft.com/office/powerpoint/2010/main" val="1297806838"/>
+        <p14:creationId xmlns:p14="http://schemas.microsoft.com/office/powerpoint/2010/main" val="2611406675"/>
       </p:ext>
     </p:extLst>
   </p:cSld>
@@ -932,7 +944,7 @@
     </p:spTree>
     <p:extLst>
       <p:ext uri="{BB962C8B-B14F-4D97-AF65-F5344CB8AC3E}">
-        <p14:creationId xmlns:p14="http://schemas.microsoft.com/office/powerpoint/2010/main" val="1734612996"/>
+        <p14:creationId xmlns:p14="http://schemas.microsoft.com/office/powerpoint/2010/main" val="1297806838"/>
       </p:ext>
     </p:extLst>
   </p:cSld>
@@ -1016,7 +1028,7 @@
     </p:spTree>
     <p:extLst>
       <p:ext uri="{BB962C8B-B14F-4D97-AF65-F5344CB8AC3E}">
-        <p14:creationId xmlns:p14="http://schemas.microsoft.com/office/powerpoint/2010/main" val="4098802840"/>
+        <p14:creationId xmlns:p14="http://schemas.microsoft.com/office/powerpoint/2010/main" val="1734612996"/>
       </p:ext>
     </p:extLst>
   </p:cSld>
@@ -1070,18 +1082,7 @@
           <a:bodyPr/>
           <a:lstStyle/>
           <a:p>
-            <a:r>
-              <a:rPr lang="de-DE"/>
-              <a:t>Do not modify the notes in this section to avoid tampering with the Poll Everywhere activity.
-More info at polleverywhere.com/support
-Was ist richtig für eine Reihen-/Serienschaltung</a:t>
-            </a:r>
-          </a:p>
-          <a:p>
-            <a:r>
-              <a:rPr lang="de-DE"/>
-              <a:t>https://www.polleverywhere.com/multiple_choice_polls/oZnfrbULL5E8Lw0SodApT?display_state=instructions&amp;activity_state=opened&amp;state=opened&amp;flow=Instructor&amp;onscreen=persist</a:t>
-            </a:r>
+            <a:endParaRPr lang="de-DE"/>
           </a:p>
         </p:txBody>
       </p:sp>
@@ -1111,7 +1112,7 @@
     </p:spTree>
     <p:extLst>
       <p:ext uri="{BB962C8B-B14F-4D97-AF65-F5344CB8AC3E}">
-        <p14:creationId xmlns:p14="http://schemas.microsoft.com/office/powerpoint/2010/main" val="3300540322"/>
+        <p14:creationId xmlns:p14="http://schemas.microsoft.com/office/powerpoint/2010/main" val="4098802840"/>
       </p:ext>
     </p:extLst>
   </p:cSld>
@@ -1175,7 +1176,7 @@
           <a:p>
             <a:r>
               <a:rPr lang="de-DE"/>
-              <a:t>https://www.polleverywhere.com/multiple_choice_polls/oZnfrbULL5E8Lw0SodApT?display_state=chart&amp;activity_state=closed&amp;state=closed&amp;flow=Instructor&amp;onscreen=persist</a:t>
+              <a:t>https://www.polleverywhere.com/multiple_choice_polls/oZnfrbULL5E8Lw0SodApT?display_state=instructions&amp;activity_state=opened&amp;state=opened&amp;flow=Instructor&amp;onscreen=persist</a:t>
             </a:r>
           </a:p>
         </p:txBody>
@@ -1206,7 +1207,7 @@
     </p:spTree>
     <p:extLst>
       <p:ext uri="{BB962C8B-B14F-4D97-AF65-F5344CB8AC3E}">
-        <p14:creationId xmlns:p14="http://schemas.microsoft.com/office/powerpoint/2010/main" val="2436327733"/>
+        <p14:creationId xmlns:p14="http://schemas.microsoft.com/office/powerpoint/2010/main" val="3300540322"/>
       </p:ext>
     </p:extLst>
   </p:cSld>
@@ -1270,7 +1271,7 @@
           <a:p>
             <a:r>
               <a:rPr lang="de-DE"/>
-              <a:t>https://www.polleverywhere.com/multiple_choice_polls/oZnfrbULL5E8Lw0SodApT?display_state=chart&amp;activity_state=closed&amp;display=correctness&amp;state=closed&amp;flow=Instructor&amp;onscreen=persist</a:t>
+              <a:t>https://www.polleverywhere.com/multiple_choice_polls/oZnfrbULL5E8Lw0SodApT?display_state=chart&amp;activity_state=closed&amp;state=closed&amp;flow=Instructor&amp;onscreen=persist</a:t>
             </a:r>
           </a:p>
         </p:txBody>
@@ -1301,7 +1302,7 @@
     </p:spTree>
     <p:extLst>
       <p:ext uri="{BB962C8B-B14F-4D97-AF65-F5344CB8AC3E}">
-        <p14:creationId xmlns:p14="http://schemas.microsoft.com/office/powerpoint/2010/main" val="1636379956"/>
+        <p14:creationId xmlns:p14="http://schemas.microsoft.com/office/powerpoint/2010/main" val="2436327733"/>
       </p:ext>
     </p:extLst>
   </p:cSld>
@@ -1359,13 +1360,13 @@
               <a:rPr lang="de-DE"/>
               <a:t>Do not modify the notes in this section to avoid tampering with the Poll Everywhere activity.
 More info at polleverywhere.com/support
-Was ist richtig für eine Parallelschaltung</a:t>
+Was ist richtig für eine Reihen-/Serienschaltung</a:t>
             </a:r>
           </a:p>
           <a:p>
             <a:r>
               <a:rPr lang="de-DE"/>
-              <a:t>https://www.polleverywhere.com/multiple_choice_polls/amrDGSMobITZH2f0g2p92?display_state=instructions&amp;activity_state=opened&amp;state=opened&amp;flow=Instructor&amp;onscreen=persist</a:t>
+              <a:t>https://www.polleverywhere.com/multiple_choice_polls/oZnfrbULL5E8Lw0SodApT?display_state=chart&amp;activity_state=closed&amp;display=correctness&amp;state=closed&amp;flow=Instructor&amp;onscreen=persist</a:t>
             </a:r>
           </a:p>
         </p:txBody>
@@ -1396,7 +1397,7 @@
     </p:spTree>
     <p:extLst>
       <p:ext uri="{BB962C8B-B14F-4D97-AF65-F5344CB8AC3E}">
-        <p14:creationId xmlns:p14="http://schemas.microsoft.com/office/powerpoint/2010/main" val="2885634971"/>
+        <p14:creationId xmlns:p14="http://schemas.microsoft.com/office/powerpoint/2010/main" val="1636379956"/>
       </p:ext>
     </p:extLst>
   </p:cSld>
@@ -1460,7 +1461,7 @@
           <a:p>
             <a:r>
               <a:rPr lang="de-DE"/>
-              <a:t>https://www.polleverywhere.com/multiple_choice_polls/amrDGSMobITZH2f0g2p92?display_state=chart&amp;activity_state=closed&amp;state=closed&amp;flow=Instructor&amp;onscreen=persist</a:t>
+              <a:t>https://www.polleverywhere.com/multiple_choice_polls/amrDGSMobITZH2f0g2p92?display_state=instructions&amp;activity_state=opened&amp;state=opened&amp;flow=Instructor&amp;onscreen=persist</a:t>
             </a:r>
           </a:p>
         </p:txBody>
@@ -1491,7 +1492,7 @@
     </p:spTree>
     <p:extLst>
       <p:ext uri="{BB962C8B-B14F-4D97-AF65-F5344CB8AC3E}">
-        <p14:creationId xmlns:p14="http://schemas.microsoft.com/office/powerpoint/2010/main" val="1640380816"/>
+        <p14:creationId xmlns:p14="http://schemas.microsoft.com/office/powerpoint/2010/main" val="2885634971"/>
       </p:ext>
     </p:extLst>
   </p:cSld>
@@ -1639,7 +1640,7 @@
           <a:p>
             <a:r>
               <a:rPr lang="de-DE"/>
-              <a:t>https://www.polleverywhere.com/multiple_choice_polls/amrDGSMobITZH2f0g2p92?display_state=chart&amp;activity_state=closed&amp;display=correctness&amp;state=closed&amp;flow=Instructor&amp;onscreen=persist</a:t>
+              <a:t>https://www.polleverywhere.com/multiple_choice_polls/amrDGSMobITZH2f0g2p92?display_state=chart&amp;activity_state=closed&amp;state=closed&amp;flow=Instructor&amp;onscreen=persist</a:t>
             </a:r>
           </a:p>
         </p:txBody>
@@ -1670,7 +1671,7 @@
     </p:spTree>
     <p:extLst>
       <p:ext uri="{BB962C8B-B14F-4D97-AF65-F5344CB8AC3E}">
-        <p14:creationId xmlns:p14="http://schemas.microsoft.com/office/powerpoint/2010/main" val="290510623"/>
+        <p14:creationId xmlns:p14="http://schemas.microsoft.com/office/powerpoint/2010/main" val="1640380816"/>
       </p:ext>
     </p:extLst>
   </p:cSld>
@@ -1724,7 +1725,18 @@
           <a:bodyPr/>
           <a:lstStyle/>
           <a:p>
-            <a:endParaRPr lang="de-DE"/>
+            <a:r>
+              <a:rPr lang="de-DE"/>
+              <a:t>Do not modify the notes in this section to avoid tampering with the Poll Everywhere activity.
+More info at polleverywhere.com/support
+Was ist richtig für eine Parallelschaltung</a:t>
+            </a:r>
+          </a:p>
+          <a:p>
+            <a:r>
+              <a:rPr lang="de-DE"/>
+              <a:t>https://www.polleverywhere.com/multiple_choice_polls/amrDGSMobITZH2f0g2p92?display_state=chart&amp;activity_state=closed&amp;display=correctness&amp;state=closed&amp;flow=Instructor&amp;onscreen=persist</a:t>
+            </a:r>
           </a:p>
         </p:txBody>
       </p:sp>
@@ -1754,7 +1766,7 @@
     </p:spTree>
     <p:extLst>
       <p:ext uri="{BB962C8B-B14F-4D97-AF65-F5344CB8AC3E}">
-        <p14:creationId xmlns:p14="http://schemas.microsoft.com/office/powerpoint/2010/main" val="2594778447"/>
+        <p14:creationId xmlns:p14="http://schemas.microsoft.com/office/powerpoint/2010/main" val="290510623"/>
       </p:ext>
     </p:extLst>
   </p:cSld>
@@ -1838,7 +1850,7 @@
     </p:spTree>
     <p:extLst>
       <p:ext uri="{BB962C8B-B14F-4D97-AF65-F5344CB8AC3E}">
-        <p14:creationId xmlns:p14="http://schemas.microsoft.com/office/powerpoint/2010/main" val="3733750996"/>
+        <p14:creationId xmlns:p14="http://schemas.microsoft.com/office/powerpoint/2010/main" val="2594778447"/>
       </p:ext>
     </p:extLst>
   </p:cSld>
@@ -1922,7 +1934,7 @@
     </p:spTree>
     <p:extLst>
       <p:ext uri="{BB962C8B-B14F-4D97-AF65-F5344CB8AC3E}">
-        <p14:creationId xmlns:p14="http://schemas.microsoft.com/office/powerpoint/2010/main" val="3235913706"/>
+        <p14:creationId xmlns:p14="http://schemas.microsoft.com/office/powerpoint/2010/main" val="3733750996"/>
       </p:ext>
     </p:extLst>
   </p:cSld>
@@ -1976,18 +1988,7 @@
           <a:bodyPr/>
           <a:lstStyle/>
           <a:p>
-            <a:r>
-              <a:rPr lang="de-DE"/>
-              <a:t>Do not modify the notes in this section to avoid tampering with the Poll Everywhere activity.
-More info at polleverywhere.com/support
-Wie messe ich Strom und Spannung eines Verbrauchers in einer Schaltung</a:t>
-            </a:r>
-          </a:p>
-          <a:p>
-            <a:r>
-              <a:rPr lang="de-DE"/>
-              <a:t>https://www.polleverywhere.com/multiple_choice_polls/1dn2bJBAP0PqGUPTYdoFH?display_state=instructions&amp;activity_state=opened&amp;state=opened&amp;flow=Instructor&amp;onscreen=persist</a:t>
-            </a:r>
+            <a:endParaRPr lang="de-DE"/>
           </a:p>
         </p:txBody>
       </p:sp>
@@ -2017,7 +2018,7 @@
     </p:spTree>
     <p:extLst>
       <p:ext uri="{BB962C8B-B14F-4D97-AF65-F5344CB8AC3E}">
-        <p14:creationId xmlns:p14="http://schemas.microsoft.com/office/powerpoint/2010/main" val="1765849938"/>
+        <p14:creationId xmlns:p14="http://schemas.microsoft.com/office/powerpoint/2010/main" val="3235913706"/>
       </p:ext>
     </p:extLst>
   </p:cSld>
@@ -2081,7 +2082,7 @@
           <a:p>
             <a:r>
               <a:rPr lang="de-DE"/>
-              <a:t>https://www.polleverywhere.com/multiple_choice_polls/1dn2bJBAP0PqGUPTYdoFH?display_state=chart&amp;activity_state=closed&amp;state=closed&amp;flow=Instructor&amp;onscreen=persist</a:t>
+              <a:t>https://www.polleverywhere.com/multiple_choice_polls/1dn2bJBAP0PqGUPTYdoFH?display_state=instructions&amp;activity_state=opened&amp;state=opened&amp;flow=Instructor&amp;onscreen=persist</a:t>
             </a:r>
           </a:p>
         </p:txBody>
@@ -2112,7 +2113,7 @@
     </p:spTree>
     <p:extLst>
       <p:ext uri="{BB962C8B-B14F-4D97-AF65-F5344CB8AC3E}">
-        <p14:creationId xmlns:p14="http://schemas.microsoft.com/office/powerpoint/2010/main" val="10941191"/>
+        <p14:creationId xmlns:p14="http://schemas.microsoft.com/office/powerpoint/2010/main" val="1765849938"/>
       </p:ext>
     </p:extLst>
   </p:cSld>
@@ -2176,7 +2177,7 @@
           <a:p>
             <a:r>
               <a:rPr lang="de-DE"/>
-              <a:t>https://www.polleverywhere.com/multiple_choice_polls/1dn2bJBAP0PqGUPTYdoFH?display_state=chart&amp;activity_state=closed&amp;display=correctness&amp;state=closed&amp;flow=Instructor&amp;onscreen=persist</a:t>
+              <a:t>https://www.polleverywhere.com/multiple_choice_polls/1dn2bJBAP0PqGUPTYdoFH?display_state=chart&amp;activity_state=closed&amp;state=closed&amp;flow=Instructor&amp;onscreen=persist</a:t>
             </a:r>
           </a:p>
         </p:txBody>
@@ -2207,7 +2208,7 @@
     </p:spTree>
     <p:extLst>
       <p:ext uri="{BB962C8B-B14F-4D97-AF65-F5344CB8AC3E}">
-        <p14:creationId xmlns:p14="http://schemas.microsoft.com/office/powerpoint/2010/main" val="2563403175"/>
+        <p14:creationId xmlns:p14="http://schemas.microsoft.com/office/powerpoint/2010/main" val="10941191"/>
       </p:ext>
     </p:extLst>
   </p:cSld>
@@ -2261,7 +2262,18 @@
           <a:bodyPr/>
           <a:lstStyle/>
           <a:p>
-            <a:endParaRPr lang="de-DE"/>
+            <a:r>
+              <a:rPr lang="de-DE"/>
+              <a:t>Do not modify the notes in this section to avoid tampering with the Poll Everywhere activity.
+More info at polleverywhere.com/support
+Wie messe ich Strom und Spannung eines Verbrauchers in einer Schaltung</a:t>
+            </a:r>
+          </a:p>
+          <a:p>
+            <a:r>
+              <a:rPr lang="de-DE"/>
+              <a:t>https://www.polleverywhere.com/multiple_choice_polls/1dn2bJBAP0PqGUPTYdoFH?display_state=chart&amp;activity_state=closed&amp;display=correctness&amp;state=closed&amp;flow=Instructor&amp;onscreen=persist</a:t>
+            </a:r>
           </a:p>
         </p:txBody>
       </p:sp>
@@ -2283,6 +2295,90 @@
             <a:fld id="{AD1D79F6-C8AD-5749-9DE6-19634A2965BA}" type="slidenum">
               <a:rPr lang="en-US" smtClean="0"/>
               <a:t>27</a:t>
+            </a:fld>
+            <a:endParaRPr lang="en-US"/>
+          </a:p>
+        </p:txBody>
+      </p:sp>
+    </p:spTree>
+    <p:extLst>
+      <p:ext uri="{BB962C8B-B14F-4D97-AF65-F5344CB8AC3E}">
+        <p14:creationId xmlns:p14="http://schemas.microsoft.com/office/powerpoint/2010/main" val="2563403175"/>
+      </p:ext>
+    </p:extLst>
+  </p:cSld>
+  <p:clrMapOvr>
+    <a:masterClrMapping/>
+  </p:clrMapOvr>
+</p:notes>
+</file>
+
+<file path=ppt/notesSlides/notesSlide28.xml><?xml version="1.0" encoding="utf-8"?>
+<p:notes xmlns:a="http://schemas.openxmlformats.org/drawingml/2006/main" xmlns:r="http://schemas.openxmlformats.org/officeDocument/2006/relationships" xmlns:p="http://schemas.openxmlformats.org/presentationml/2006/main">
+  <p:cSld>
+    <p:spTree>
+      <p:nvGrpSpPr>
+        <p:cNvPr id="1" name=""/>
+        <p:cNvGrpSpPr/>
+        <p:nvPr/>
+      </p:nvGrpSpPr>
+      <p:grpSpPr>
+        <a:xfrm>
+          <a:off x="0" y="0"/>
+          <a:ext cx="0" cy="0"/>
+          <a:chOff x="0" y="0"/>
+          <a:chExt cx="0" cy="0"/>
+        </a:xfrm>
+      </p:grpSpPr>
+      <p:sp>
+        <p:nvSpPr>
+          <p:cNvPr id="2" name="Folienbildplatzhalter 1"/>
+          <p:cNvSpPr>
+            <a:spLocks noGrp="1" noRot="1" noChangeAspect="1"/>
+          </p:cNvSpPr>
+          <p:nvPr>
+            <p:ph type="sldImg"/>
+          </p:nvPr>
+        </p:nvSpPr>
+        <p:spPr/>
+      </p:sp>
+      <p:sp>
+        <p:nvSpPr>
+          <p:cNvPr id="3" name="Notizenplatzhalter 2"/>
+          <p:cNvSpPr>
+            <a:spLocks noGrp="1"/>
+          </p:cNvSpPr>
+          <p:nvPr>
+            <p:ph type="body" idx="1"/>
+          </p:nvPr>
+        </p:nvSpPr>
+        <p:spPr/>
+        <p:txBody>
+          <a:bodyPr/>
+          <a:lstStyle/>
+          <a:p>
+            <a:endParaRPr lang="de-DE"/>
+          </a:p>
+        </p:txBody>
+      </p:sp>
+      <p:sp>
+        <p:nvSpPr>
+          <p:cNvPr id="4" name="Foliennummernplatzhalter 3"/>
+          <p:cNvSpPr>
+            <a:spLocks noGrp="1"/>
+          </p:cNvSpPr>
+          <p:nvPr>
+            <p:ph type="sldNum" sz="quarter" idx="5"/>
+          </p:nvPr>
+        </p:nvSpPr>
+        <p:spPr/>
+        <p:txBody>
+          <a:bodyPr/>
+          <a:lstStyle/>
+          <a:p>
+            <a:fld id="{AD1D79F6-C8AD-5749-9DE6-19634A2965BA}" type="slidenum">
+              <a:rPr lang="en-US" smtClean="0"/>
+              <a:t>28</a:t>
             </a:fld>
             <a:endParaRPr lang="en-US"/>
           </a:p>
@@ -2429,18 +2525,7 @@
           <a:bodyPr/>
           <a:lstStyle/>
           <a:p>
-            <a:r>
-              <a:rPr lang="de-DE"/>
-              <a:t>Do not modify the notes in this section to avoid tampering with the Poll Everywhere activity.
-More info at polleverywhere.com/support
-Wähle Symbol und Einheit für Spannung</a:t>
-            </a:r>
-          </a:p>
-          <a:p>
-            <a:r>
-              <a:rPr lang="de-DE"/>
-              <a:t>https://www.polleverywhere.com/multiple_choice_polls/UpnIuD2UbeEj5i773AuQ0?state=opened&amp;flow=Default&amp;onscreen=persist</a:t>
-            </a:r>
+            <a:endParaRPr lang="de-DE"/>
           </a:p>
         </p:txBody>
       </p:sp>
@@ -2470,7 +2555,7 @@
     </p:spTree>
     <p:extLst>
       <p:ext uri="{BB962C8B-B14F-4D97-AF65-F5344CB8AC3E}">
-        <p14:creationId xmlns:p14="http://schemas.microsoft.com/office/powerpoint/2010/main" val="1583686994"/>
+        <p14:creationId xmlns:p14="http://schemas.microsoft.com/office/powerpoint/2010/main" val="472827135"/>
       </p:ext>
     </p:extLst>
   </p:cSld>
@@ -2528,13 +2613,13 @@
               <a:rPr lang="de-DE"/>
               <a:t>Do not modify the notes in this section to avoid tampering with the Poll Everywhere activity.
 More info at polleverywhere.com/support
-Wähle Symbol und Einheit für Strom</a:t>
+Wähle Symbol und Einheit für Spannung</a:t>
             </a:r>
           </a:p>
           <a:p>
             <a:r>
               <a:rPr lang="de-DE"/>
-              <a:t>https://www.polleverywhere.com/multiple_choice_polls/pYh1YFUFBnWqPdUTOwwyD</a:t>
+              <a:t>https://www.polleverywhere.com/multiple_choice_polls/UpnIuD2UbeEj5i773AuQ0?state=opened&amp;flow=Default&amp;onscreen=persist</a:t>
             </a:r>
           </a:p>
         </p:txBody>
@@ -2565,7 +2650,7 @@
     </p:spTree>
     <p:extLst>
       <p:ext uri="{BB962C8B-B14F-4D97-AF65-F5344CB8AC3E}">
-        <p14:creationId xmlns:p14="http://schemas.microsoft.com/office/powerpoint/2010/main" val="632467831"/>
+        <p14:creationId xmlns:p14="http://schemas.microsoft.com/office/powerpoint/2010/main" val="1583686994"/>
       </p:ext>
     </p:extLst>
   </p:cSld>
@@ -2623,13 +2708,13 @@
               <a:rPr lang="de-DE"/>
               <a:t>Do not modify the notes in this section to avoid tampering with the Poll Everywhere activity.
 More info at polleverywhere.com/support
-Wähle Symbol und Einheit für Widerstand</a:t>
+Wähle Symbol und Einheit für Strom</a:t>
             </a:r>
           </a:p>
           <a:p>
             <a:r>
               <a:rPr lang="de-DE"/>
-              <a:t>https://www.polleverywhere.com/multiple_choice_polls/WXW433gzuenwj3jlqSnaJ</a:t>
+              <a:t>https://www.polleverywhere.com/multiple_choice_polls/pYh1YFUFBnWqPdUTOwwyD</a:t>
             </a:r>
           </a:p>
         </p:txBody>
@@ -2660,7 +2745,7 @@
     </p:spTree>
     <p:extLst>
       <p:ext uri="{BB962C8B-B14F-4D97-AF65-F5344CB8AC3E}">
-        <p14:creationId xmlns:p14="http://schemas.microsoft.com/office/powerpoint/2010/main" val="1938277484"/>
+        <p14:creationId xmlns:p14="http://schemas.microsoft.com/office/powerpoint/2010/main" val="632467831"/>
       </p:ext>
     </p:extLst>
   </p:cSld>
@@ -2714,7 +2799,18 @@
           <a:bodyPr/>
           <a:lstStyle/>
           <a:p>
-            <a:endParaRPr lang="de-DE"/>
+            <a:r>
+              <a:rPr lang="de-DE"/>
+              <a:t>Do not modify the notes in this section to avoid tampering with the Poll Everywhere activity.
+More info at polleverywhere.com/support
+Wähle Symbol und Einheit für Widerstand</a:t>
+            </a:r>
+          </a:p>
+          <a:p>
+            <a:r>
+              <a:rPr lang="de-DE"/>
+              <a:t>https://www.polleverywhere.com/multiple_choice_polls/WXW433gzuenwj3jlqSnaJ</a:t>
+            </a:r>
           </a:p>
         </p:txBody>
       </p:sp>
@@ -2744,7 +2840,7 @@
     </p:spTree>
     <p:extLst>
       <p:ext uri="{BB962C8B-B14F-4D97-AF65-F5344CB8AC3E}">
-        <p14:creationId xmlns:p14="http://schemas.microsoft.com/office/powerpoint/2010/main" val="1756511591"/>
+        <p14:creationId xmlns:p14="http://schemas.microsoft.com/office/powerpoint/2010/main" val="1938277484"/>
       </p:ext>
     </p:extLst>
   </p:cSld>
@@ -2798,18 +2894,7 @@
           <a:bodyPr/>
           <a:lstStyle/>
           <a:p>
-            <a:r>
-              <a:rPr lang="de-DE"/>
-              <a:t>Do not modify the notes in this section to avoid tampering with the Poll Everywhere activity.
-More info at polleverywhere.com/support
-Wähle alle richtigen Umformungen des Ohm'schen Gesetzes</a:t>
-            </a:r>
-          </a:p>
-          <a:p>
-            <a:r>
-              <a:rPr lang="de-DE"/>
-              <a:t>https://www.polleverywhere.com/multiple_choice_polls/LcaC7rJcn1wda6zmC8G9d?display_state=instructions&amp;activity_state=opened&amp;state=opened&amp;flow=Instructor&amp;onscreen=persist</a:t>
-            </a:r>
+            <a:endParaRPr lang="de-DE"/>
           </a:p>
         </p:txBody>
       </p:sp>
@@ -2839,7 +2924,7 @@
     </p:spTree>
     <p:extLst>
       <p:ext uri="{BB962C8B-B14F-4D97-AF65-F5344CB8AC3E}">
-        <p14:creationId xmlns:p14="http://schemas.microsoft.com/office/powerpoint/2010/main" val="4151767021"/>
+        <p14:creationId xmlns:p14="http://schemas.microsoft.com/office/powerpoint/2010/main" val="1756511591"/>
       </p:ext>
     </p:extLst>
   </p:cSld>
@@ -2903,7 +2988,7 @@
           <a:p>
             <a:r>
               <a:rPr lang="de-DE"/>
-              <a:t>https://www.polleverywhere.com/multiple_choice_polls/LcaC7rJcn1wda6zmC8G9d?display_state=chart&amp;activity_state=closed&amp;state=closed&amp;flow=Instructor&amp;onscreen=persist</a:t>
+              <a:t>https://www.polleverywhere.com/multiple_choice_polls/LcaC7rJcn1wda6zmC8G9d?display_state=instructions&amp;activity_state=opened&amp;state=opened&amp;flow=Instructor&amp;onscreen=persist</a:t>
             </a:r>
           </a:p>
         </p:txBody>
@@ -2934,7 +3019,7 @@
     </p:spTree>
     <p:extLst>
       <p:ext uri="{BB962C8B-B14F-4D97-AF65-F5344CB8AC3E}">
-        <p14:creationId xmlns:p14="http://schemas.microsoft.com/office/powerpoint/2010/main" val="2513493308"/>
+        <p14:creationId xmlns:p14="http://schemas.microsoft.com/office/powerpoint/2010/main" val="4151767021"/>
       </p:ext>
     </p:extLst>
   </p:cSld>
@@ -3091,7 +3176,7 @@
           <a:p>
             <a:fld id="{46878720-212C-42BB-B356-99628BFE1EBF}" type="datetimeFigureOut">
               <a:rPr lang="en-US" smtClean="0"/>
-              <a:t>11/4/22</a:t>
+              <a:t>11/7/22</a:t>
             </a:fld>
             <a:endParaRPr lang="en-US"/>
           </a:p>
@@ -3289,7 +3374,7 @@
           <a:p>
             <a:fld id="{46878720-212C-42BB-B356-99628BFE1EBF}" type="datetimeFigureOut">
               <a:rPr lang="en-US" smtClean="0"/>
-              <a:t>11/4/22</a:t>
+              <a:t>11/7/22</a:t>
             </a:fld>
             <a:endParaRPr lang="en-US"/>
           </a:p>
@@ -3497,7 +3582,7 @@
           <a:p>
             <a:fld id="{46878720-212C-42BB-B356-99628BFE1EBF}" type="datetimeFigureOut">
               <a:rPr lang="en-US" smtClean="0"/>
-              <a:t>11/4/22</a:t>
+              <a:t>11/7/22</a:t>
             </a:fld>
             <a:endParaRPr lang="en-US"/>
           </a:p>
@@ -5672,7 +5757,7 @@
           <a:p>
             <a:fld id="{46878720-212C-42BB-B356-99628BFE1EBF}" type="datetimeFigureOut">
               <a:rPr lang="en-US" smtClean="0"/>
-              <a:t>11/4/22</a:t>
+              <a:t>11/7/22</a:t>
             </a:fld>
             <a:endParaRPr lang="en-US"/>
           </a:p>
@@ -6879,7 +6964,7 @@
           <a:p>
             <a:fld id="{46878720-212C-42BB-B356-99628BFE1EBF}" type="datetimeFigureOut">
               <a:rPr lang="en-US" smtClean="0"/>
-              <a:t>11/4/22</a:t>
+              <a:t>11/7/22</a:t>
             </a:fld>
             <a:endParaRPr lang="en-US"/>
           </a:p>
@@ -7144,7 +7229,7 @@
           <a:p>
             <a:fld id="{46878720-212C-42BB-B356-99628BFE1EBF}" type="datetimeFigureOut">
               <a:rPr lang="en-US" smtClean="0"/>
-              <a:t>11/4/22</a:t>
+              <a:t>11/7/22</a:t>
             </a:fld>
             <a:endParaRPr lang="en-US"/>
           </a:p>
@@ -7556,7 +7641,7 @@
           <a:p>
             <a:fld id="{46878720-212C-42BB-B356-99628BFE1EBF}" type="datetimeFigureOut">
               <a:rPr lang="en-US" smtClean="0"/>
-              <a:t>11/4/22</a:t>
+              <a:t>11/7/22</a:t>
             </a:fld>
             <a:endParaRPr lang="en-US"/>
           </a:p>
@@ -7697,7 +7782,7 @@
           <a:p>
             <a:fld id="{46878720-212C-42BB-B356-99628BFE1EBF}" type="datetimeFigureOut">
               <a:rPr lang="en-US" smtClean="0"/>
-              <a:t>11/4/22</a:t>
+              <a:t>11/7/22</a:t>
             </a:fld>
             <a:endParaRPr lang="en-US"/>
           </a:p>
@@ -7810,7 +7895,7 @@
           <a:p>
             <a:fld id="{46878720-212C-42BB-B356-99628BFE1EBF}" type="datetimeFigureOut">
               <a:rPr lang="en-US" smtClean="0"/>
-              <a:t>11/4/22</a:t>
+              <a:t>11/7/22</a:t>
             </a:fld>
             <a:endParaRPr lang="en-US"/>
           </a:p>
@@ -8121,7 +8206,7 @@
           <a:p>
             <a:fld id="{46878720-212C-42BB-B356-99628BFE1EBF}" type="datetimeFigureOut">
               <a:rPr lang="en-US" smtClean="0"/>
-              <a:t>11/4/22</a:t>
+              <a:t>11/7/22</a:t>
             </a:fld>
             <a:endParaRPr lang="en-US"/>
           </a:p>
@@ -8409,7 +8494,7 @@
           <a:p>
             <a:fld id="{46878720-212C-42BB-B356-99628BFE1EBF}" type="datetimeFigureOut">
               <a:rPr lang="en-US" smtClean="0"/>
-              <a:t>11/4/22</a:t>
+              <a:t>11/7/22</a:t>
             </a:fld>
             <a:endParaRPr lang="en-US"/>
           </a:p>
@@ -8650,7 +8735,7 @@
           <a:p>
             <a:fld id="{46878720-212C-42BB-B356-99628BFE1EBF}" type="datetimeFigureOut">
               <a:rPr lang="en-US" smtClean="0"/>
-              <a:t>11/4/22</a:t>
+              <a:t>11/7/22</a:t>
             </a:fld>
             <a:endParaRPr lang="en-US"/>
           </a:p>
@@ -10440,6 +10525,122 @@
           <p:cNvPr id="2" name="Titel 1">
             <a:extLst>
               <a:ext uri="{FF2B5EF4-FFF2-40B4-BE49-F238E27FC236}">
+                <a16:creationId xmlns:a16="http://schemas.microsoft.com/office/drawing/2014/main" id="{0E007D1F-609E-9E0A-97CB-A916A12D2E55}"/>
+              </a:ext>
+            </a:extLst>
+          </p:cNvPr>
+          <p:cNvSpPr>
+            <a:spLocks noGrp="1"/>
+          </p:cNvSpPr>
+          <p:nvPr>
+            <p:ph type="ctrTitle"/>
+          </p:nvPr>
+        </p:nvSpPr>
+        <p:spPr/>
+        <p:txBody>
+          <a:bodyPr/>
+          <a:lstStyle/>
+          <a:p>
+            <a:endParaRPr lang="de-DE"/>
+          </a:p>
+        </p:txBody>
+      </p:sp>
+      <p:sp>
+        <p:nvSpPr>
+          <p:cNvPr id="3" name="Untertitel 2">
+            <a:extLst>
+              <a:ext uri="{FF2B5EF4-FFF2-40B4-BE49-F238E27FC236}">
+                <a16:creationId xmlns:a16="http://schemas.microsoft.com/office/drawing/2014/main" id="{096C13AD-945B-B6D7-F38E-A36EA59DCE07}"/>
+              </a:ext>
+            </a:extLst>
+          </p:cNvPr>
+          <p:cNvSpPr>
+            <a:spLocks noGrp="1"/>
+          </p:cNvSpPr>
+          <p:nvPr>
+            <p:ph type="subTitle" idx="1"/>
+          </p:nvPr>
+        </p:nvSpPr>
+        <p:spPr/>
+        <p:txBody>
+          <a:bodyPr/>
+          <a:lstStyle/>
+          <a:p>
+            <a:endParaRPr lang="de-DE"/>
+          </a:p>
+        </p:txBody>
+      </p:sp>
+      <p:pic>
+        <p:nvPicPr>
+          <p:cNvPr id="5" name="slide.url=https://www.polleverywhere.com/multiple_choice_polls/LcaC7rJcn1wda6zmC8G9d?display_state=chart&amp;activity_state=closed&amp;state=closed&amp;flow=Instructor&amp;onscreen=persist">
+            <a:extLst>
+              <a:ext uri="{FF2B5EF4-FFF2-40B4-BE49-F238E27FC236}">
+                <a16:creationId xmlns:a16="http://schemas.microsoft.com/office/drawing/2014/main" id="{D9B41B43-0B4E-488F-36C2-63250E69323B}"/>
+              </a:ext>
+            </a:extLst>
+          </p:cNvPr>
+          <p:cNvPicPr>
+            <a:picLocks/>
+          </p:cNvPicPr>
+          <p:nvPr/>
+        </p:nvPicPr>
+        <p:blipFill>
+          <a:blip r:embed="rId3">
+            <a:extLst>
+              <a:ext uri="{28A0092B-C50C-407E-A947-70E740481C1C}">
+                <a14:useLocalDpi xmlns:a14="http://schemas.microsoft.com/office/drawing/2010/main" val="0"/>
+              </a:ext>
+            </a:extLst>
+          </a:blip>
+          <a:stretch>
+            <a:fillRect/>
+          </a:stretch>
+        </p:blipFill>
+        <p:spPr>
+          <a:xfrm>
+            <a:off x="63500" y="63500"/>
+            <a:ext cx="12065000" cy="6731000"/>
+          </a:xfrm>
+          <a:prstGeom prst="rect">
+            <a:avLst/>
+          </a:prstGeom>
+        </p:spPr>
+      </p:pic>
+    </p:spTree>
+    <p:extLst>
+      <p:ext uri="{BB962C8B-B14F-4D97-AF65-F5344CB8AC3E}">
+        <p14:creationId xmlns:p14="http://schemas.microsoft.com/office/powerpoint/2010/main" val="2952952370"/>
+      </p:ext>
+    </p:extLst>
+  </p:cSld>
+  <p:clrMapOvr>
+    <a:masterClrMapping/>
+  </p:clrMapOvr>
+</p:sld>
+</file>
+
+<file path=ppt/slides/slide11.xml><?xml version="1.0" encoding="utf-8"?>
+<p:sld xmlns:a="http://schemas.openxmlformats.org/drawingml/2006/main" xmlns:r="http://schemas.openxmlformats.org/officeDocument/2006/relationships" xmlns:p="http://schemas.openxmlformats.org/presentationml/2006/main">
+  <p:cSld>
+    <p:spTree>
+      <p:nvGrpSpPr>
+        <p:cNvPr id="1" name=""/>
+        <p:cNvGrpSpPr/>
+        <p:nvPr/>
+      </p:nvGrpSpPr>
+      <p:grpSpPr>
+        <a:xfrm>
+          <a:off x="0" y="0"/>
+          <a:ext cx="0" cy="0"/>
+          <a:chOff x="0" y="0"/>
+          <a:chExt cx="0" cy="0"/>
+        </a:xfrm>
+      </p:grpSpPr>
+      <p:sp>
+        <p:nvSpPr>
+          <p:cNvPr id="2" name="Titel 1">
+            <a:extLst>
+              <a:ext uri="{FF2B5EF4-FFF2-40B4-BE49-F238E27FC236}">
                 <a16:creationId xmlns:a16="http://schemas.microsoft.com/office/drawing/2014/main" id="{071DBCE9-F9EC-EED8-BB92-D2355AD1B110}"/>
               </a:ext>
             </a:extLst>
@@ -10534,7 +10735,7 @@
 </p:sld>
 </file>
 
-<file path=ppt/slides/slide11.xml><?xml version="1.0" encoding="utf-8"?>
+<file path=ppt/slides/slide12.xml><?xml version="1.0" encoding="utf-8"?>
 <p:sld xmlns:a="http://schemas.openxmlformats.org/drawingml/2006/main" xmlns:r="http://schemas.openxmlformats.org/officeDocument/2006/relationships" xmlns:p="http://schemas.openxmlformats.org/presentationml/2006/main">
   <p:cSld>
     <p:spTree>
@@ -11135,7 +11336,7 @@
 </p:sld>
 </file>
 
-<file path=ppt/slides/slide12.xml><?xml version="1.0" encoding="utf-8"?>
+<file path=ppt/slides/slide13.xml><?xml version="1.0" encoding="utf-8"?>
 <p:sld xmlns:a="http://schemas.openxmlformats.org/drawingml/2006/main" xmlns:r="http://schemas.openxmlformats.org/officeDocument/2006/relationships" xmlns:p="http://schemas.openxmlformats.org/presentationml/2006/main">
   <p:cSld>
     <p:spTree>
@@ -11195,7 +11396,7 @@
 </p:sld>
 </file>
 
-<file path=ppt/slides/slide13.xml><?xml version="1.0" encoding="utf-8"?>
+<file path=ppt/slides/slide14.xml><?xml version="1.0" encoding="utf-8"?>
 <p:sld xmlns:a="http://schemas.openxmlformats.org/drawingml/2006/main" xmlns:r="http://schemas.openxmlformats.org/officeDocument/2006/relationships" xmlns:p="http://schemas.openxmlformats.org/presentationml/2006/main">
   <p:cSld>
     <p:spTree>
@@ -11680,7 +11881,7 @@
 </p:sld>
 </file>
 
-<file path=ppt/slides/slide14.xml><?xml version="1.0" encoding="utf-8"?>
+<file path=ppt/slides/slide15.xml><?xml version="1.0" encoding="utf-8"?>
 <p:sld xmlns:a="http://schemas.openxmlformats.org/drawingml/2006/main" xmlns:r="http://schemas.openxmlformats.org/officeDocument/2006/relationships" xmlns:p="http://schemas.openxmlformats.org/presentationml/2006/main">
   <p:cSld>
     <p:spTree>
@@ -11740,7 +11941,7 @@
 </p:sld>
 </file>
 
-<file path=ppt/slides/slide15.xml><?xml version="1.0" encoding="utf-8"?>
+<file path=ppt/slides/slide16.xml><?xml version="1.0" encoding="utf-8"?>
 <p:sld xmlns:a="http://schemas.openxmlformats.org/drawingml/2006/main" xmlns:r="http://schemas.openxmlformats.org/officeDocument/2006/relationships" xmlns:p="http://schemas.openxmlformats.org/presentationml/2006/main">
   <p:cSld>
     <p:spTree>
@@ -11856,7 +12057,7 @@
 </p:sld>
 </file>
 
-<file path=ppt/slides/slide16.xml><?xml version="1.0" encoding="utf-8"?>
+<file path=ppt/slides/slide17.xml><?xml version="1.0" encoding="utf-8"?>
 <p:sld xmlns:a="http://schemas.openxmlformats.org/drawingml/2006/main" xmlns:r="http://schemas.openxmlformats.org/officeDocument/2006/relationships" xmlns:p="http://schemas.openxmlformats.org/presentationml/2006/main">
   <p:cSld>
     <p:spTree>
@@ -11972,7 +12173,7 @@
 </p:sld>
 </file>
 
-<file path=ppt/slides/slide17.xml><?xml version="1.0" encoding="utf-8"?>
+<file path=ppt/slides/slide18.xml><?xml version="1.0" encoding="utf-8"?>
 <p:sld xmlns:a="http://schemas.openxmlformats.org/drawingml/2006/main" xmlns:r="http://schemas.openxmlformats.org/officeDocument/2006/relationships" xmlns:p="http://schemas.openxmlformats.org/presentationml/2006/main">
   <p:cSld>
     <p:spTree>
@@ -12088,7 +12289,7 @@
 </p:sld>
 </file>
 
-<file path=ppt/slides/slide18.xml><?xml version="1.0" encoding="utf-8"?>
+<file path=ppt/slides/slide19.xml><?xml version="1.0" encoding="utf-8"?>
 <p:sld xmlns:a="http://schemas.openxmlformats.org/drawingml/2006/main" xmlns:r="http://schemas.openxmlformats.org/officeDocument/2006/relationships" xmlns:p="http://schemas.openxmlformats.org/presentationml/2006/main">
   <p:cSld>
     <p:spTree>
@@ -12195,122 +12396,6 @@
     <p:extLst>
       <p:ext uri="{BB962C8B-B14F-4D97-AF65-F5344CB8AC3E}">
         <p14:creationId xmlns:p14="http://schemas.microsoft.com/office/powerpoint/2010/main" val="4238325287"/>
-      </p:ext>
-    </p:extLst>
-  </p:cSld>
-  <p:clrMapOvr>
-    <a:masterClrMapping/>
-  </p:clrMapOvr>
-</p:sld>
-</file>
-
-<file path=ppt/slides/slide19.xml><?xml version="1.0" encoding="utf-8"?>
-<p:sld xmlns:a="http://schemas.openxmlformats.org/drawingml/2006/main" xmlns:r="http://schemas.openxmlformats.org/officeDocument/2006/relationships" xmlns:p="http://schemas.openxmlformats.org/presentationml/2006/main">
-  <p:cSld>
-    <p:spTree>
-      <p:nvGrpSpPr>
-        <p:cNvPr id="1" name=""/>
-        <p:cNvGrpSpPr/>
-        <p:nvPr/>
-      </p:nvGrpSpPr>
-      <p:grpSpPr>
-        <a:xfrm>
-          <a:off x="0" y="0"/>
-          <a:ext cx="0" cy="0"/>
-          <a:chOff x="0" y="0"/>
-          <a:chExt cx="0" cy="0"/>
-        </a:xfrm>
-      </p:grpSpPr>
-      <p:sp>
-        <p:nvSpPr>
-          <p:cNvPr id="2" name="Titel 1">
-            <a:extLst>
-              <a:ext uri="{FF2B5EF4-FFF2-40B4-BE49-F238E27FC236}">
-                <a16:creationId xmlns:a16="http://schemas.microsoft.com/office/drawing/2014/main" id="{3FD99846-173C-D4DB-7BDB-979B3BB2AF71}"/>
-              </a:ext>
-            </a:extLst>
-          </p:cNvPr>
-          <p:cNvSpPr>
-            <a:spLocks noGrp="1"/>
-          </p:cNvSpPr>
-          <p:nvPr>
-            <p:ph type="ctrTitle"/>
-          </p:nvPr>
-        </p:nvSpPr>
-        <p:spPr/>
-        <p:txBody>
-          <a:bodyPr/>
-          <a:lstStyle/>
-          <a:p>
-            <a:endParaRPr lang="de-DE"/>
-          </a:p>
-        </p:txBody>
-      </p:sp>
-      <p:sp>
-        <p:nvSpPr>
-          <p:cNvPr id="3" name="Untertitel 2">
-            <a:extLst>
-              <a:ext uri="{FF2B5EF4-FFF2-40B4-BE49-F238E27FC236}">
-                <a16:creationId xmlns:a16="http://schemas.microsoft.com/office/drawing/2014/main" id="{59404D2F-1659-202E-F5C7-6FA826AF4340}"/>
-              </a:ext>
-            </a:extLst>
-          </p:cNvPr>
-          <p:cNvSpPr>
-            <a:spLocks noGrp="1"/>
-          </p:cNvSpPr>
-          <p:nvPr>
-            <p:ph type="subTitle" idx="1"/>
-          </p:nvPr>
-        </p:nvSpPr>
-        <p:spPr/>
-        <p:txBody>
-          <a:bodyPr/>
-          <a:lstStyle/>
-          <a:p>
-            <a:endParaRPr lang="de-DE"/>
-          </a:p>
-        </p:txBody>
-      </p:sp>
-      <p:pic>
-        <p:nvPicPr>
-          <p:cNvPr id="5" name="slide.url=https://www.polleverywhere.com/multiple_choice_polls/amrDGSMobITZH2f0g2p92?display_state=chart&amp;activity_state=closed&amp;state=closed&amp;flow=Instructor&amp;onscreen=persist">
-            <a:extLst>
-              <a:ext uri="{FF2B5EF4-FFF2-40B4-BE49-F238E27FC236}">
-                <a16:creationId xmlns:a16="http://schemas.microsoft.com/office/drawing/2014/main" id="{BF7129FA-C744-65FB-8B6C-7EAC26E60727}"/>
-              </a:ext>
-            </a:extLst>
-          </p:cNvPr>
-          <p:cNvPicPr>
-            <a:picLocks/>
-          </p:cNvPicPr>
-          <p:nvPr/>
-        </p:nvPicPr>
-        <p:blipFill>
-          <a:blip r:embed="rId3">
-            <a:extLst>
-              <a:ext uri="{28A0092B-C50C-407E-A947-70E740481C1C}">
-                <a14:useLocalDpi xmlns:a14="http://schemas.microsoft.com/office/drawing/2010/main" val="0"/>
-              </a:ext>
-            </a:extLst>
-          </a:blip>
-          <a:stretch>
-            <a:fillRect/>
-          </a:stretch>
-        </p:blipFill>
-        <p:spPr>
-          <a:xfrm>
-            <a:off x="63500" y="63500"/>
-            <a:ext cx="12065000" cy="6731000"/>
-          </a:xfrm>
-          <a:prstGeom prst="rect">
-            <a:avLst/>
-          </a:prstGeom>
-        </p:spPr>
-      </p:pic>
-    </p:spTree>
-    <p:extLst>
-      <p:ext uri="{BB962C8B-B14F-4D97-AF65-F5344CB8AC3E}">
-        <p14:creationId xmlns:p14="http://schemas.microsoft.com/office/powerpoint/2010/main" val="3622558685"/>
       </p:ext>
     </p:extLst>
   </p:cSld>
@@ -12441,6 +12526,122 @@
           <p:cNvPr id="2" name="Titel 1">
             <a:extLst>
               <a:ext uri="{FF2B5EF4-FFF2-40B4-BE49-F238E27FC236}">
+                <a16:creationId xmlns:a16="http://schemas.microsoft.com/office/drawing/2014/main" id="{3FD99846-173C-D4DB-7BDB-979B3BB2AF71}"/>
+              </a:ext>
+            </a:extLst>
+          </p:cNvPr>
+          <p:cNvSpPr>
+            <a:spLocks noGrp="1"/>
+          </p:cNvSpPr>
+          <p:nvPr>
+            <p:ph type="ctrTitle"/>
+          </p:nvPr>
+        </p:nvSpPr>
+        <p:spPr/>
+        <p:txBody>
+          <a:bodyPr/>
+          <a:lstStyle/>
+          <a:p>
+            <a:endParaRPr lang="de-DE"/>
+          </a:p>
+        </p:txBody>
+      </p:sp>
+      <p:sp>
+        <p:nvSpPr>
+          <p:cNvPr id="3" name="Untertitel 2">
+            <a:extLst>
+              <a:ext uri="{FF2B5EF4-FFF2-40B4-BE49-F238E27FC236}">
+                <a16:creationId xmlns:a16="http://schemas.microsoft.com/office/drawing/2014/main" id="{59404D2F-1659-202E-F5C7-6FA826AF4340}"/>
+              </a:ext>
+            </a:extLst>
+          </p:cNvPr>
+          <p:cNvSpPr>
+            <a:spLocks noGrp="1"/>
+          </p:cNvSpPr>
+          <p:nvPr>
+            <p:ph type="subTitle" idx="1"/>
+          </p:nvPr>
+        </p:nvSpPr>
+        <p:spPr/>
+        <p:txBody>
+          <a:bodyPr/>
+          <a:lstStyle/>
+          <a:p>
+            <a:endParaRPr lang="de-DE"/>
+          </a:p>
+        </p:txBody>
+      </p:sp>
+      <p:pic>
+        <p:nvPicPr>
+          <p:cNvPr id="5" name="slide.url=https://www.polleverywhere.com/multiple_choice_polls/amrDGSMobITZH2f0g2p92?display_state=chart&amp;activity_state=closed&amp;state=closed&amp;flow=Instructor&amp;onscreen=persist">
+            <a:extLst>
+              <a:ext uri="{FF2B5EF4-FFF2-40B4-BE49-F238E27FC236}">
+                <a16:creationId xmlns:a16="http://schemas.microsoft.com/office/drawing/2014/main" id="{BF7129FA-C744-65FB-8B6C-7EAC26E60727}"/>
+              </a:ext>
+            </a:extLst>
+          </p:cNvPr>
+          <p:cNvPicPr>
+            <a:picLocks/>
+          </p:cNvPicPr>
+          <p:nvPr/>
+        </p:nvPicPr>
+        <p:blipFill>
+          <a:blip r:embed="rId3">
+            <a:extLst>
+              <a:ext uri="{28A0092B-C50C-407E-A947-70E740481C1C}">
+                <a14:useLocalDpi xmlns:a14="http://schemas.microsoft.com/office/drawing/2010/main" val="0"/>
+              </a:ext>
+            </a:extLst>
+          </a:blip>
+          <a:stretch>
+            <a:fillRect/>
+          </a:stretch>
+        </p:blipFill>
+        <p:spPr>
+          <a:xfrm>
+            <a:off x="63500" y="63500"/>
+            <a:ext cx="12065000" cy="6731000"/>
+          </a:xfrm>
+          <a:prstGeom prst="rect">
+            <a:avLst/>
+          </a:prstGeom>
+        </p:spPr>
+      </p:pic>
+    </p:spTree>
+    <p:extLst>
+      <p:ext uri="{BB962C8B-B14F-4D97-AF65-F5344CB8AC3E}">
+        <p14:creationId xmlns:p14="http://schemas.microsoft.com/office/powerpoint/2010/main" val="3622558685"/>
+      </p:ext>
+    </p:extLst>
+  </p:cSld>
+  <p:clrMapOvr>
+    <a:masterClrMapping/>
+  </p:clrMapOvr>
+</p:sld>
+</file>
+
+<file path=ppt/slides/slide21.xml><?xml version="1.0" encoding="utf-8"?>
+<p:sld xmlns:a="http://schemas.openxmlformats.org/drawingml/2006/main" xmlns:r="http://schemas.openxmlformats.org/officeDocument/2006/relationships" xmlns:p="http://schemas.openxmlformats.org/presentationml/2006/main">
+  <p:cSld>
+    <p:spTree>
+      <p:nvGrpSpPr>
+        <p:cNvPr id="1" name=""/>
+        <p:cNvGrpSpPr/>
+        <p:nvPr/>
+      </p:nvGrpSpPr>
+      <p:grpSpPr>
+        <a:xfrm>
+          <a:off x="0" y="0"/>
+          <a:ext cx="0" cy="0"/>
+          <a:chOff x="0" y="0"/>
+          <a:chExt cx="0" cy="0"/>
+        </a:xfrm>
+      </p:grpSpPr>
+      <p:sp>
+        <p:nvSpPr>
+          <p:cNvPr id="2" name="Titel 1">
+            <a:extLst>
+              <a:ext uri="{FF2B5EF4-FFF2-40B4-BE49-F238E27FC236}">
                 <a16:creationId xmlns:a16="http://schemas.microsoft.com/office/drawing/2014/main" id="{6785AFB5-7F2B-39A9-ECCD-01E506CD9E36}"/>
               </a:ext>
             </a:extLst>
@@ -12535,7 +12736,7 @@
 </p:sld>
 </file>
 
-<file path=ppt/slides/slide21.xml><?xml version="1.0" encoding="utf-8"?>
+<file path=ppt/slides/slide22.xml><?xml version="1.0" encoding="utf-8"?>
 <p:sld xmlns:a="http://schemas.openxmlformats.org/drawingml/2006/main" xmlns:r="http://schemas.openxmlformats.org/officeDocument/2006/relationships" xmlns:p="http://schemas.openxmlformats.org/presentationml/2006/main">
   <p:cSld>
     <p:spTree>
@@ -12716,7 +12917,7 @@
 </p:sld>
 </file>
 
-<file path=ppt/slides/slide22.xml><?xml version="1.0" encoding="utf-8"?>
+<file path=ppt/slides/slide23.xml><?xml version="1.0" encoding="utf-8"?>
 <p:sld xmlns:a="http://schemas.openxmlformats.org/drawingml/2006/main" xmlns:r="http://schemas.openxmlformats.org/officeDocument/2006/relationships" xmlns:p="http://schemas.openxmlformats.org/presentationml/2006/main">
   <p:cSld>
     <p:bg>
@@ -12916,7 +13117,7 @@
 </p:sld>
 </file>
 
-<file path=ppt/slides/slide23.xml><?xml version="1.0" encoding="utf-8"?>
+<file path=ppt/slides/slide24.xml><?xml version="1.0" encoding="utf-8"?>
 <p:sld xmlns:a="http://schemas.openxmlformats.org/drawingml/2006/main" xmlns:r="http://schemas.openxmlformats.org/officeDocument/2006/relationships" xmlns:p="http://schemas.openxmlformats.org/presentationml/2006/main">
   <p:cSld>
     <p:spTree>
@@ -12976,7 +13177,7 @@
 </p:sld>
 </file>
 
-<file path=ppt/slides/slide24.xml><?xml version="1.0" encoding="utf-8"?>
+<file path=ppt/slides/slide25.xml><?xml version="1.0" encoding="utf-8"?>
 <p:sld xmlns:a="http://schemas.openxmlformats.org/drawingml/2006/main" xmlns:r="http://schemas.openxmlformats.org/officeDocument/2006/relationships" xmlns:p="http://schemas.openxmlformats.org/presentationml/2006/main">
   <p:cSld>
     <p:spTree>
@@ -13092,7 +13293,7 @@
 </p:sld>
 </file>
 
-<file path=ppt/slides/slide25.xml><?xml version="1.0" encoding="utf-8"?>
+<file path=ppt/slides/slide26.xml><?xml version="1.0" encoding="utf-8"?>
 <p:sld xmlns:a="http://schemas.openxmlformats.org/drawingml/2006/main" xmlns:r="http://schemas.openxmlformats.org/officeDocument/2006/relationships" xmlns:p="http://schemas.openxmlformats.org/presentationml/2006/main">
   <p:cSld>
     <p:spTree>
@@ -13208,7 +13409,7 @@
 </p:sld>
 </file>
 
-<file path=ppt/slides/slide26.xml><?xml version="1.0" encoding="utf-8"?>
+<file path=ppt/slides/slide27.xml><?xml version="1.0" encoding="utf-8"?>
 <p:sld xmlns:a="http://schemas.openxmlformats.org/drawingml/2006/main" xmlns:r="http://schemas.openxmlformats.org/officeDocument/2006/relationships" xmlns:p="http://schemas.openxmlformats.org/presentationml/2006/main">
   <p:cSld>
     <p:spTree>
@@ -13324,7 +13525,7 @@
 </p:sld>
 </file>
 
-<file path=ppt/slides/slide27.xml><?xml version="1.0" encoding="utf-8"?>
+<file path=ppt/slides/slide28.xml><?xml version="1.0" encoding="utf-8"?>
 <p:sld xmlns:a="http://schemas.openxmlformats.org/drawingml/2006/main" xmlns:r="http://schemas.openxmlformats.org/officeDocument/2006/relationships" xmlns:p="http://schemas.openxmlformats.org/presentationml/2006/main">
   <p:cSld>
     <p:spTree>
@@ -14010,6 +14211,152 @@
           <p:cNvPr id="2" name="Titel 1">
             <a:extLst>
               <a:ext uri="{FF2B5EF4-FFF2-40B4-BE49-F238E27FC236}">
+                <a16:creationId xmlns:a16="http://schemas.microsoft.com/office/drawing/2014/main" id="{8C8FDB73-9474-486A-559B-F2E4FB00FE9D}"/>
+              </a:ext>
+            </a:extLst>
+          </p:cNvPr>
+          <p:cNvSpPr>
+            <a:spLocks noGrp="1"/>
+          </p:cNvSpPr>
+          <p:nvPr>
+            <p:ph type="title"/>
+          </p:nvPr>
+        </p:nvSpPr>
+        <p:spPr/>
+        <p:txBody>
+          <a:bodyPr/>
+          <a:lstStyle/>
+          <a:p>
+            <a:r>
+              <a:rPr lang="de-DE" dirty="0"/>
+              <a:t>Interaktive Fragen während des Kurses</a:t>
+            </a:r>
+            <a:br>
+              <a:rPr lang="de-DE" dirty="0"/>
+            </a:br>
+            <a:r>
+              <a:rPr lang="de-DE" dirty="0"/>
+              <a:t>auf Handy oder PC beantworten:</a:t>
+            </a:r>
+          </a:p>
+        </p:txBody>
+      </p:sp>
+      <p:sp>
+        <p:nvSpPr>
+          <p:cNvPr id="3" name="Inhaltsplatzhalter 2">
+            <a:extLst>
+              <a:ext uri="{FF2B5EF4-FFF2-40B4-BE49-F238E27FC236}">
+                <a16:creationId xmlns:a16="http://schemas.microsoft.com/office/drawing/2014/main" id="{3764EB85-7D7D-6B12-1CC8-1EB244255619}"/>
+              </a:ext>
+            </a:extLst>
+          </p:cNvPr>
+          <p:cNvSpPr>
+            <a:spLocks noGrp="1"/>
+          </p:cNvSpPr>
+          <p:nvPr>
+            <p:ph idx="1"/>
+          </p:nvPr>
+        </p:nvSpPr>
+        <p:spPr/>
+        <p:txBody>
+          <a:bodyPr/>
+          <a:lstStyle/>
+          <a:p>
+            <a:r>
+              <a:rPr lang="de-DE" dirty="0"/>
+              <a:t>Um mitzumachen:    	</a:t>
+            </a:r>
+            <a:r>
+              <a:rPr lang="de-DE" dirty="0" err="1"/>
+              <a:t>pollev.com</a:t>
+            </a:r>
+            <a:endParaRPr lang="de-DE" dirty="0"/>
+          </a:p>
+          <a:p>
+            <a:r>
+              <a:rPr lang="de-DE" dirty="0"/>
+              <a:t>Eingeben: 			PETERB635</a:t>
+            </a:r>
+          </a:p>
+          <a:p>
+            <a:r>
+              <a:rPr lang="de-DE" dirty="0"/>
+              <a:t>Optional einen Namen angeben (Spitzname oder Klarname)</a:t>
+            </a:r>
+          </a:p>
+          <a:p>
+            <a:r>
+              <a:rPr lang="de-DE" dirty="0"/>
+              <a:t>Oder diesen QR-Code verwenden</a:t>
+            </a:r>
+          </a:p>
+        </p:txBody>
+      </p:sp>
+      <p:pic>
+        <p:nvPicPr>
+          <p:cNvPr id="4" name="Grafik 3">
+            <a:extLst>
+              <a:ext uri="{FF2B5EF4-FFF2-40B4-BE49-F238E27FC236}">
+                <a16:creationId xmlns:a16="http://schemas.microsoft.com/office/drawing/2014/main" id="{C209BB2B-24CC-A055-0FFB-A6F01E6F99B3}"/>
+              </a:ext>
+            </a:extLst>
+          </p:cNvPr>
+          <p:cNvPicPr>
+            <a:picLocks noChangeAspect="1"/>
+          </p:cNvPicPr>
+          <p:nvPr/>
+        </p:nvPicPr>
+        <p:blipFill>
+          <a:blip r:embed="rId3"/>
+          <a:stretch>
+            <a:fillRect/>
+          </a:stretch>
+        </p:blipFill>
+        <p:spPr>
+          <a:xfrm>
+            <a:off x="7180826" y="3302000"/>
+            <a:ext cx="3606800" cy="3556000"/>
+          </a:xfrm>
+          <a:prstGeom prst="rect">
+            <a:avLst/>
+          </a:prstGeom>
+        </p:spPr>
+      </p:pic>
+    </p:spTree>
+    <p:extLst>
+      <p:ext uri="{BB962C8B-B14F-4D97-AF65-F5344CB8AC3E}">
+        <p14:creationId xmlns:p14="http://schemas.microsoft.com/office/powerpoint/2010/main" val="2404916275"/>
+      </p:ext>
+    </p:extLst>
+  </p:cSld>
+  <p:clrMapOvr>
+    <a:masterClrMapping/>
+  </p:clrMapOvr>
+</p:sld>
+</file>
+
+<file path=ppt/slides/slide5.xml><?xml version="1.0" encoding="utf-8"?>
+<p:sld xmlns:a="http://schemas.openxmlformats.org/drawingml/2006/main" xmlns:r="http://schemas.openxmlformats.org/officeDocument/2006/relationships" xmlns:p="http://schemas.openxmlformats.org/presentationml/2006/main">
+  <p:cSld>
+    <p:spTree>
+      <p:nvGrpSpPr>
+        <p:cNvPr id="1" name=""/>
+        <p:cNvGrpSpPr/>
+        <p:nvPr/>
+      </p:nvGrpSpPr>
+      <p:grpSpPr>
+        <a:xfrm>
+          <a:off x="0" y="0"/>
+          <a:ext cx="0" cy="0"/>
+          <a:chOff x="0" y="0"/>
+          <a:chExt cx="0" cy="0"/>
+        </a:xfrm>
+      </p:grpSpPr>
+      <p:sp>
+        <p:nvSpPr>
+          <p:cNvPr id="2" name="Titel 1">
+            <a:extLst>
+              <a:ext uri="{FF2B5EF4-FFF2-40B4-BE49-F238E27FC236}">
                 <a16:creationId xmlns:a16="http://schemas.microsoft.com/office/drawing/2014/main" id="{BBBE4C53-0206-7E28-03BF-A7FA413B7CA3}"/>
               </a:ext>
             </a:extLst>
@@ -14104,7 +14451,7 @@
 </p:sld>
 </file>
 
-<file path=ppt/slides/slide5.xml><?xml version="1.0" encoding="utf-8"?>
+<file path=ppt/slides/slide6.xml><?xml version="1.0" encoding="utf-8"?>
 <p:sld xmlns:a="http://schemas.openxmlformats.org/drawingml/2006/main" xmlns:r="http://schemas.openxmlformats.org/officeDocument/2006/relationships" xmlns:p="http://schemas.openxmlformats.org/presentationml/2006/main">
   <p:cSld>
     <p:spTree>
@@ -14220,7 +14567,7 @@
 </p:sld>
 </file>
 
-<file path=ppt/slides/slide6.xml><?xml version="1.0" encoding="utf-8"?>
+<file path=ppt/slides/slide7.xml><?xml version="1.0" encoding="utf-8"?>
 <p:sld xmlns:a="http://schemas.openxmlformats.org/drawingml/2006/main" xmlns:r="http://schemas.openxmlformats.org/officeDocument/2006/relationships" xmlns:p="http://schemas.openxmlformats.org/presentationml/2006/main">
   <p:cSld>
     <p:spTree>
@@ -14336,7 +14683,7 @@
 </p:sld>
 </file>
 
-<file path=ppt/slides/slide7.xml><?xml version="1.0" encoding="utf-8"?>
+<file path=ppt/slides/slide8.xml><?xml version="1.0" encoding="utf-8"?>
 <p:sld xmlns:a="http://schemas.openxmlformats.org/drawingml/2006/main" xmlns:r="http://schemas.openxmlformats.org/officeDocument/2006/relationships" xmlns:p="http://schemas.openxmlformats.org/presentationml/2006/main">
   <p:cSld>
     <p:spTree>
@@ -14397,7 +14744,7 @@
                   <a:spcPct val="0"/>
                 </a:spcAft>
               </a:pPr>
-              <a:t>7</a:t>
+              <a:t>8</a:t>
             </a:fld>
             <a:endParaRPr lang="de-DE" altLang="de-DE">
               <a:solidFill>
@@ -15289,7 +15636,7 @@
 </p:sld>
 </file>
 
-<file path=ppt/slides/slide8.xml><?xml version="1.0" encoding="utf-8"?>
+<file path=ppt/slides/slide9.xml><?xml version="1.0" encoding="utf-8"?>
 <p:sld xmlns:a="http://schemas.openxmlformats.org/drawingml/2006/main" xmlns:r="http://schemas.openxmlformats.org/officeDocument/2006/relationships" xmlns:p="http://schemas.openxmlformats.org/presentationml/2006/main">
   <p:cSld>
     <p:spTree>
@@ -15396,122 +15743,6 @@
     <p:extLst>
       <p:ext uri="{BB962C8B-B14F-4D97-AF65-F5344CB8AC3E}">
         <p14:creationId xmlns:p14="http://schemas.microsoft.com/office/powerpoint/2010/main" val="3072685976"/>
-      </p:ext>
-    </p:extLst>
-  </p:cSld>
-  <p:clrMapOvr>
-    <a:masterClrMapping/>
-  </p:clrMapOvr>
-</p:sld>
-</file>
-
-<file path=ppt/slides/slide9.xml><?xml version="1.0" encoding="utf-8"?>
-<p:sld xmlns:a="http://schemas.openxmlformats.org/drawingml/2006/main" xmlns:r="http://schemas.openxmlformats.org/officeDocument/2006/relationships" xmlns:p="http://schemas.openxmlformats.org/presentationml/2006/main">
-  <p:cSld>
-    <p:spTree>
-      <p:nvGrpSpPr>
-        <p:cNvPr id="1" name=""/>
-        <p:cNvGrpSpPr/>
-        <p:nvPr/>
-      </p:nvGrpSpPr>
-      <p:grpSpPr>
-        <a:xfrm>
-          <a:off x="0" y="0"/>
-          <a:ext cx="0" cy="0"/>
-          <a:chOff x="0" y="0"/>
-          <a:chExt cx="0" cy="0"/>
-        </a:xfrm>
-      </p:grpSpPr>
-      <p:sp>
-        <p:nvSpPr>
-          <p:cNvPr id="2" name="Titel 1">
-            <a:extLst>
-              <a:ext uri="{FF2B5EF4-FFF2-40B4-BE49-F238E27FC236}">
-                <a16:creationId xmlns:a16="http://schemas.microsoft.com/office/drawing/2014/main" id="{0E007D1F-609E-9E0A-97CB-A916A12D2E55}"/>
-              </a:ext>
-            </a:extLst>
-          </p:cNvPr>
-          <p:cNvSpPr>
-            <a:spLocks noGrp="1"/>
-          </p:cNvSpPr>
-          <p:nvPr>
-            <p:ph type="ctrTitle"/>
-          </p:nvPr>
-        </p:nvSpPr>
-        <p:spPr/>
-        <p:txBody>
-          <a:bodyPr/>
-          <a:lstStyle/>
-          <a:p>
-            <a:endParaRPr lang="de-DE"/>
-          </a:p>
-        </p:txBody>
-      </p:sp>
-      <p:sp>
-        <p:nvSpPr>
-          <p:cNvPr id="3" name="Untertitel 2">
-            <a:extLst>
-              <a:ext uri="{FF2B5EF4-FFF2-40B4-BE49-F238E27FC236}">
-                <a16:creationId xmlns:a16="http://schemas.microsoft.com/office/drawing/2014/main" id="{096C13AD-945B-B6D7-F38E-A36EA59DCE07}"/>
-              </a:ext>
-            </a:extLst>
-          </p:cNvPr>
-          <p:cNvSpPr>
-            <a:spLocks noGrp="1"/>
-          </p:cNvSpPr>
-          <p:nvPr>
-            <p:ph type="subTitle" idx="1"/>
-          </p:nvPr>
-        </p:nvSpPr>
-        <p:spPr/>
-        <p:txBody>
-          <a:bodyPr/>
-          <a:lstStyle/>
-          <a:p>
-            <a:endParaRPr lang="de-DE"/>
-          </a:p>
-        </p:txBody>
-      </p:sp>
-      <p:pic>
-        <p:nvPicPr>
-          <p:cNvPr id="5" name="slide.url=https://www.polleverywhere.com/multiple_choice_polls/LcaC7rJcn1wda6zmC8G9d?display_state=chart&amp;activity_state=closed&amp;state=closed&amp;flow=Instructor&amp;onscreen=persist">
-            <a:extLst>
-              <a:ext uri="{FF2B5EF4-FFF2-40B4-BE49-F238E27FC236}">
-                <a16:creationId xmlns:a16="http://schemas.microsoft.com/office/drawing/2014/main" id="{D9B41B43-0B4E-488F-36C2-63250E69323B}"/>
-              </a:ext>
-            </a:extLst>
-          </p:cNvPr>
-          <p:cNvPicPr>
-            <a:picLocks/>
-          </p:cNvPicPr>
-          <p:nvPr/>
-        </p:nvPicPr>
-        <p:blipFill>
-          <a:blip r:embed="rId3">
-            <a:extLst>
-              <a:ext uri="{28A0092B-C50C-407E-A947-70E740481C1C}">
-                <a14:useLocalDpi xmlns:a14="http://schemas.microsoft.com/office/drawing/2010/main" val="0"/>
-              </a:ext>
-            </a:extLst>
-          </a:blip>
-          <a:stretch>
-            <a:fillRect/>
-          </a:stretch>
-        </p:blipFill>
-        <p:spPr>
-          <a:xfrm>
-            <a:off x="63500" y="63500"/>
-            <a:ext cx="12065000" cy="6731000"/>
-          </a:xfrm>
-          <a:prstGeom prst="rect">
-            <a:avLst/>
-          </a:prstGeom>
-        </p:spPr>
-      </p:pic>
-    </p:spTree>
-    <p:extLst>
-      <p:ext uri="{BB962C8B-B14F-4D97-AF65-F5344CB8AC3E}">
-        <p14:creationId xmlns:p14="http://schemas.microsoft.com/office/powerpoint/2010/main" val="2952952370"/>
       </p:ext>
     </p:extLst>
   </p:cSld>
@@ -16815,6 +17046,12 @@
 </file>
 
 <file path=customXml/item2.xml><?xml version="1.0" encoding="utf-8"?>
+<p:properties xmlns:p="http://schemas.microsoft.com/office/2006/metadata/properties" xmlns:xsi="http://www.w3.org/2001/XMLSchema-instance" xmlns:pc="http://schemas.microsoft.com/office/infopath/2007/PartnerControls">
+  <documentManagement/>
+</p:properties>
+</file>
+
+<file path=customXml/item3.xml><?xml version="1.0" encoding="utf-8"?>
 <ct:contentTypeSchema xmlns:ct="http://schemas.microsoft.com/office/2006/metadata/contentType" xmlns:ma="http://schemas.microsoft.com/office/2006/metadata/properties/metaAttributes" ct:_="" ma:_="" ma:contentTypeName="Document" ma:contentTypeID="0x010100B4B9B92454B73847AA0367335585965E" ma:contentTypeVersion="12" ma:contentTypeDescription="Create a new document." ma:contentTypeScope="" ma:versionID="e03bd757301da460c704f3115d541a61">
   <xsd:schema xmlns:xsd="http://www.w3.org/2001/XMLSchema" xmlns:xs="http://www.w3.org/2001/XMLSchema" xmlns:p="http://schemas.microsoft.com/office/2006/metadata/properties" xmlns:ns2="7e0397fa-c04e-494e-b1f1-774ad14ae133" xmlns:ns3="8413540a-1bb6-4053-94a1-f89835fea1c0" targetNamespace="http://schemas.microsoft.com/office/2006/metadata/properties" ma:root="true" ma:fieldsID="8a43826bbb8ef7d01dc3ce4144ed7f57" ns2:_="" ns3:_="">
     <xsd:import namespace="7e0397fa-c04e-494e-b1f1-774ad14ae133"/>
@@ -17031,12 +17268,6 @@
 </ct:contentTypeSchema>
 </file>
 
-<file path=customXml/item3.xml><?xml version="1.0" encoding="utf-8"?>
-<p:properties xmlns:p="http://schemas.microsoft.com/office/2006/metadata/properties" xmlns:xsi="http://www.w3.org/2001/XMLSchema-instance" xmlns:pc="http://schemas.microsoft.com/office/infopath/2007/PartnerControls">
-  <documentManagement/>
-</p:properties>
-</file>
-
 <file path=customXml/itemProps1.xml><?xml version="1.0" encoding="utf-8"?>
 <ds:datastoreItem xmlns:ds="http://schemas.openxmlformats.org/officeDocument/2006/customXml" ds:itemID="{19285E5B-5F99-40AB-B4B4-B67FE3E29063}">
   <ds:schemaRefs>
@@ -17046,6 +17277,23 @@
 </file>
 
 <file path=customXml/itemProps2.xml><?xml version="1.0" encoding="utf-8"?>
+<ds:datastoreItem xmlns:ds="http://schemas.openxmlformats.org/officeDocument/2006/customXml" ds:itemID="{68B22CCF-3790-4DAF-9B94-BBE8105DACDB}">
+  <ds:schemaRefs>
+    <ds:schemaRef ds:uri="http://purl.org/dc/elements/1.1/"/>
+    <ds:schemaRef ds:uri="http://schemas.openxmlformats.org/package/2006/metadata/core-properties"/>
+    <ds:schemaRef ds:uri="http://schemas.microsoft.com/office/2006/documentManagement/types"/>
+    <ds:schemaRef ds:uri="7e0397fa-c04e-494e-b1f1-774ad14ae133"/>
+    <ds:schemaRef ds:uri="http://www.w3.org/XML/1998/namespace"/>
+    <ds:schemaRef ds:uri="http://schemas.microsoft.com/office/infopath/2007/PartnerControls"/>
+    <ds:schemaRef ds:uri="http://purl.org/dc/dcmitype/"/>
+    <ds:schemaRef ds:uri="8413540a-1bb6-4053-94a1-f89835fea1c0"/>
+    <ds:schemaRef ds:uri="http://schemas.microsoft.com/office/2006/metadata/properties"/>
+    <ds:schemaRef ds:uri="http://purl.org/dc/terms/"/>
+  </ds:schemaRefs>
+</ds:datastoreItem>
+</file>
+
+<file path=customXml/itemProps3.xml><?xml version="1.0" encoding="utf-8"?>
 <ds:datastoreItem xmlns:ds="http://schemas.openxmlformats.org/officeDocument/2006/customXml" ds:itemID="{A66B1A69-4B86-4CD0-9260-0F88A0083DD6}">
   <ds:schemaRefs>
     <ds:schemaRef ds:uri="http://schemas.microsoft.com/office/2006/metadata/contentType"/>
@@ -17062,21 +17310,4 @@
     <ds:schemaRef ds:uri="http://schemas.microsoft.com/internal/obd"/>
   </ds:schemaRefs>
 </ds:datastoreItem>
-</file>
-
-<file path=customXml/itemProps3.xml><?xml version="1.0" encoding="utf-8"?>
-<ds:datastoreItem xmlns:ds="http://schemas.openxmlformats.org/officeDocument/2006/customXml" ds:itemID="{68B22CCF-3790-4DAF-9B94-BBE8105DACDB}">
-  <ds:schemaRefs>
-    <ds:schemaRef ds:uri="http://purl.org/dc/elements/1.1/"/>
-    <ds:schemaRef ds:uri="http://schemas.openxmlformats.org/package/2006/metadata/core-properties"/>
-    <ds:schemaRef ds:uri="http://schemas.microsoft.com/office/2006/documentManagement/types"/>
-    <ds:schemaRef ds:uri="7e0397fa-c04e-494e-b1f1-774ad14ae133"/>
-    <ds:schemaRef ds:uri="http://www.w3.org/XML/1998/namespace"/>
-    <ds:schemaRef ds:uri="http://schemas.microsoft.com/office/infopath/2007/PartnerControls"/>
-    <ds:schemaRef ds:uri="http://purl.org/dc/dcmitype/"/>
-    <ds:schemaRef ds:uri="8413540a-1bb6-4053-94a1-f89835fea1c0"/>
-    <ds:schemaRef ds:uri="http://schemas.microsoft.com/office/2006/metadata/properties"/>
-    <ds:schemaRef ds:uri="http://purl.org/dc/terms/"/>
-  </ds:schemaRefs>
-</ds:datastoreItem>
 </file>
</xml_diff>